<commit_message>
Applied comments on poster and presentation except for the video
</commit_message>
<xml_diff>
--- a/AHS_2017_Poster_24_36.pptx
+++ b/AHS_2017_Poster_24_36.pptx
@@ -257,7 +257,7 @@
             <a:fld id="{E6CC2317-6751-4CD4-9995-8782DD78E936}" type="datetimeFigureOut">
               <a:rPr lang="en-US" smtClean="0"/>
               <a:pPr/>
-              <a:t>7/17/17</a:t>
+              <a:t>7/17/2017</a:t>
             </a:fld>
             <a:endParaRPr lang="en-US" dirty="0"/>
           </a:p>
@@ -569,64 +569,64 @@
         <p:spPr/>
         <p:txBody>
           <a:bodyPr>
-            <a:normAutofit fontScale="92500" lnSpcReduction="20000"/>
+            <a:normAutofit fontScale="40000" lnSpcReduction="20000"/>
           </a:bodyPr>
           <a:lstStyle/>
           <a:p>
             <a:r>
-              <a:rPr lang="en-US" dirty="0" smtClean="0"/>
+              <a:rPr lang="en-US" dirty="0"/>
               <a:t>TEXT TOO SMALL, at least 24 and titles 32</a:t>
             </a:r>
           </a:p>
           <a:p>
             <a:r>
-              <a:rPr lang="en-US" dirty="0" smtClean="0"/>
+              <a:rPr lang="en-US" dirty="0"/>
               <a:t>Consistency</a:t>
             </a:r>
             <a:r>
-              <a:rPr lang="en-US" baseline="0" dirty="0" smtClean="0"/>
+              <a:rPr lang="en-US" baseline="0" dirty="0"/>
               <a:t> with fonts: use </a:t>
             </a:r>
             <a:r>
-              <a:rPr lang="en-US" baseline="0" dirty="0" err="1" smtClean="0"/>
+              <a:rPr lang="en-US" baseline="0" dirty="0" err="1"/>
               <a:t>calibri</a:t>
             </a:r>
             <a:r>
-              <a:rPr lang="en-US" baseline="0" dirty="0" smtClean="0"/>
+              <a:rPr lang="en-US" baseline="0" dirty="0"/>
               <a:t> everywhere </a:t>
             </a:r>
           </a:p>
           <a:p>
             <a:r>
-              <a:rPr lang="en-US" baseline="0" dirty="0" smtClean="0"/>
+              <a:rPr lang="en-US" baseline="0" dirty="0"/>
               <a:t>Not a Motivation but Cyber-security techniques</a:t>
             </a:r>
           </a:p>
           <a:p>
             <a:r>
-              <a:rPr lang="en-US" baseline="0" dirty="0" smtClean="0"/>
+              <a:rPr lang="en-US" baseline="0" dirty="0"/>
               <a:t>Problem formulation need to be trimmed down</a:t>
             </a:r>
           </a:p>
           <a:p>
             <a:r>
-              <a:rPr lang="en-US" baseline="0" dirty="0" smtClean="0"/>
+              <a:rPr lang="en-US" baseline="0" dirty="0"/>
               <a:t>No need to say ”the online </a:t>
             </a:r>
             <a:r>
-              <a:rPr lang="en-US" baseline="0" dirty="0" err="1" smtClean="0"/>
+              <a:rPr lang="en-US" baseline="0" dirty="0" err="1"/>
               <a:t>controlelr</a:t>
             </a:r>
             <a:r>
-              <a:rPr lang="en-US" baseline="0" dirty="0" smtClean="0"/>
+              <a:rPr lang="en-US" baseline="0" dirty="0"/>
               <a:t> adaptation uses model predictive </a:t>
             </a:r>
             <a:r>
-              <a:rPr lang="en-US" baseline="0" dirty="0" err="1" smtClean="0"/>
+              <a:rPr lang="en-US" baseline="0" dirty="0" err="1"/>
               <a:t>control..instead</a:t>
             </a:r>
             <a:r>
-              <a:rPr lang="en-US" baseline="0" dirty="0" smtClean="0"/>
+              <a:rPr lang="en-US" baseline="0" dirty="0"/>
               <a:t> say MPC to calculate the sequence of inputs</a:t>
             </a:r>
           </a:p>
@@ -636,7 +636,7 @@
               <a:buChar char="-"/>
             </a:pPr>
             <a:r>
-              <a:rPr lang="en-US" baseline="0" dirty="0" smtClean="0"/>
+              <a:rPr lang="en-US" baseline="0" dirty="0"/>
               <a:t>Delay is time varying and not known a priori</a:t>
             </a:r>
           </a:p>
@@ -646,7 +646,7 @@
               <a:buChar char="-"/>
             </a:pPr>
             <a:r>
-              <a:rPr lang="en-US" baseline="0" dirty="0" smtClean="0"/>
+              <a:rPr lang="en-US" baseline="0" dirty="0"/>
               <a:t>Estimation of delay using EWMA</a:t>
             </a:r>
           </a:p>
@@ -656,7 +656,7 @@
               <a:buChar char="-"/>
             </a:pPr>
             <a:r>
-              <a:rPr lang="en-US" baseline="0" dirty="0" smtClean="0"/>
+              <a:rPr lang="en-US" baseline="0" dirty="0"/>
               <a:t>Unsafe region sentence do not make sense ???? Add figure on the side of the equation</a:t>
             </a:r>
           </a:p>
@@ -666,15 +666,15 @@
               <a:buNone/>
             </a:pPr>
             <a:r>
-              <a:rPr lang="en-US" baseline="0" dirty="0" smtClean="0"/>
+              <a:rPr lang="en-US" baseline="0" dirty="0"/>
               <a:t>Last column: Remove Simulations and </a:t>
             </a:r>
             <a:r>
-              <a:rPr lang="en-US" baseline="0" dirty="0" err="1" smtClean="0"/>
+              <a:rPr lang="en-US" baseline="0" dirty="0" err="1"/>
               <a:t>Experiemnts</a:t>
             </a:r>
             <a:r>
-              <a:rPr lang="en-US" baseline="0" dirty="0" smtClean="0"/>
+              <a:rPr lang="en-US" baseline="0" dirty="0"/>
               <a:t> and just put Simulations and then experiments</a:t>
             </a:r>
           </a:p>
@@ -684,15 +684,15 @@
               <a:buNone/>
             </a:pPr>
             <a:r>
-              <a:rPr lang="en-US" baseline="0" dirty="0" smtClean="0"/>
+              <a:rPr lang="en-US" baseline="0" dirty="0"/>
               <a:t>Shrink the table</a:t>
             </a:r>
             <a:r>
-              <a:rPr lang="mr-IN" baseline="0" dirty="0" smtClean="0"/>
+              <a:rPr lang="mr-IN" baseline="0" dirty="0"/>
               <a:t>…</a:t>
             </a:r>
             <a:r>
-              <a:rPr lang="en-US" baseline="0" dirty="0" smtClean="0"/>
+              <a:rPr lang="en-US" baseline="0" dirty="0"/>
               <a:t>too much space</a:t>
             </a:r>
           </a:p>
@@ -702,23 +702,23 @@
               <a:buNone/>
             </a:pPr>
             <a:r>
-              <a:rPr lang="en-US" baseline="0" dirty="0" smtClean="0"/>
+              <a:rPr lang="en-US" baseline="0" dirty="0"/>
               <a:t>Remove ”we” ..it’s a poster</a:t>
             </a:r>
             <a:r>
-              <a:rPr lang="mr-IN" baseline="0" dirty="0" smtClean="0"/>
+              <a:rPr lang="mr-IN" baseline="0" dirty="0"/>
               <a:t>…</a:t>
             </a:r>
             <a:r>
-              <a:rPr lang="en-US" baseline="0" dirty="0" smtClean="0"/>
+              <a:rPr lang="en-US" baseline="0" dirty="0"/>
               <a:t>go </a:t>
             </a:r>
             <a:r>
-              <a:rPr lang="en-US" baseline="0" dirty="0" err="1" smtClean="0"/>
+              <a:rPr lang="en-US" baseline="0" dirty="0" err="1"/>
               <a:t>doirectly</a:t>
             </a:r>
             <a:r>
-              <a:rPr lang="en-US" baseline="0" dirty="0" smtClean="0"/>
+              <a:rPr lang="en-US" baseline="0" dirty="0"/>
               <a:t> to the point</a:t>
             </a:r>
           </a:p>
@@ -741,7 +741,7 @@
               <a:defRPr/>
             </a:pPr>
             <a:r>
-              <a:rPr lang="en-US" baseline="0" dirty="0" smtClean="0"/>
+              <a:rPr lang="en-US" baseline="0" dirty="0"/>
               <a:t>What’s ML?</a:t>
             </a:r>
           </a:p>
@@ -764,15 +764,15 @@
               <a:defRPr/>
             </a:pPr>
             <a:r>
-              <a:rPr lang="en-US" baseline="0" dirty="0" smtClean="0"/>
+              <a:rPr lang="en-US" baseline="0" dirty="0"/>
               <a:t>Add delay </a:t>
             </a:r>
             <a:r>
-              <a:rPr lang="en-US" baseline="0" dirty="0" err="1" smtClean="0"/>
+              <a:rPr lang="en-US" baseline="0" dirty="0" err="1"/>
               <a:t>patetrn</a:t>
             </a:r>
             <a:r>
-              <a:rPr lang="en-US" baseline="0" dirty="0" smtClean="0"/>
+              <a:rPr lang="en-US" baseline="0" dirty="0"/>
               <a:t> near figure of delay in simulation</a:t>
             </a:r>
           </a:p>
@@ -795,12 +795,8 @@
               <a:defRPr/>
             </a:pPr>
             <a:r>
-              <a:rPr lang="en-US" baseline="0" dirty="0" smtClean="0"/>
-              <a:t>Add titles on </a:t>
-            </a:r>
-            <a:r>
-              <a:rPr lang="en-US" baseline="0" smtClean="0"/>
-              <a:t>each snapshot </a:t>
+              <a:rPr lang="en-US" baseline="0" dirty="0"/>
+              <a:t>Add titles on each snapshot </a:t>
             </a:r>
           </a:p>
           <a:p>
@@ -821,7 +817,7 @@
               <a:tabLst/>
               <a:defRPr/>
             </a:pPr>
-            <a:endParaRPr lang="en-US" baseline="0" dirty="0" smtClean="0"/>
+            <a:endParaRPr lang="en-US" baseline="0" dirty="0"/>
           </a:p>
           <a:p>
             <a:pPr marL="0" indent="0">
@@ -3260,15 +3256,6 @@
                 </a:rPr>
                 <a:t>PosterPresentations.com</a:t>
               </a:r>
-              <a:r>
-                <a:rPr lang="en-US" sz="1800" dirty="0">
-                  <a:solidFill>
-                    <a:schemeClr val="bg1"/>
-                  </a:solidFill>
-                  <a:latin typeface="Trebuchet MS" pitchFamily="34" charset="0"/>
-                </a:rPr>
-                <a:t/>
-              </a:r>
               <a:br>
                 <a:rPr lang="en-US" sz="1800" dirty="0">
                   <a:solidFill>
@@ -3540,15 +3527,6 @@
             </a:p>
             <a:p>
               <a:pPr algn="l"/>
-              <a:r>
-                <a:rPr lang="en-US" sz="1800" b="1" baseline="0" dirty="0">
-                  <a:solidFill>
-                    <a:schemeClr val="bg1"/>
-                  </a:solidFill>
-                  <a:latin typeface="Trebuchet MS" pitchFamily="34" charset="0"/>
-                </a:rPr>
-                <a:t/>
-              </a:r>
               <a:br>
                 <a:rPr lang="en-US" sz="1800" b="1" baseline="0" dirty="0">
                   <a:solidFill>
@@ -11581,15 +11559,6 @@
                 </a:rPr>
                 <a:t>PosterPresentations.com</a:t>
               </a:r>
-              <a:r>
-                <a:rPr lang="en-US" sz="1800" dirty="0">
-                  <a:solidFill>
-                    <a:schemeClr val="bg1"/>
-                  </a:solidFill>
-                  <a:latin typeface="Trebuchet MS" pitchFamily="34" charset="0"/>
-                </a:rPr>
-                <a:t/>
-              </a:r>
               <a:br>
                 <a:rPr lang="en-US" sz="1800" dirty="0">
                   <a:solidFill>
@@ -11861,15 +11830,6 @@
             </a:p>
             <a:p>
               <a:pPr algn="l"/>
-              <a:r>
-                <a:rPr lang="en-US" sz="1800" b="1" baseline="0" dirty="0">
-                  <a:solidFill>
-                    <a:schemeClr val="bg1"/>
-                  </a:solidFill>
-                  <a:latin typeface="Trebuchet MS" pitchFamily="34" charset="0"/>
-                </a:rPr>
-                <a:t/>
-              </a:r>
               <a:br>
                 <a:rPr lang="en-US" sz="1800" b="1" baseline="0" dirty="0">
                   <a:solidFill>
@@ -18057,7 +18017,7 @@
         <p:spPr>
           <a:xfrm>
             <a:off x="661359" y="4187838"/>
-            <a:ext cx="4905320" cy="3432092"/>
+            <a:ext cx="4905320" cy="2988894"/>
           </a:xfrm>
         </p:spPr>
         <p:txBody>
@@ -18072,19 +18032,7 @@
               <a:rPr lang="en-US" sz="2400" dirty="0">
                 <a:latin typeface="+mj-lt"/>
               </a:rPr>
-              <a:t>Modern cyber-physical systems are not built with </a:t>
-            </a:r>
-            <a:r>
-              <a:rPr lang="en-US" sz="2400" dirty="0" smtClean="0">
-                <a:latin typeface="+mj-lt"/>
-              </a:rPr>
-              <a:t>cyber-security </a:t>
-            </a:r>
-            <a:r>
-              <a:rPr lang="en-US" sz="2400" dirty="0">
-                <a:latin typeface="+mj-lt"/>
-              </a:rPr>
-              <a:t>in mind.</a:t>
+              <a:t>Modern cyber-physical systems are not built with cyber-security in mind.</a:t>
             </a:r>
           </a:p>
           <a:p>
@@ -18096,19 +18044,7 @@
               <a:rPr lang="en-US" sz="2400" dirty="0">
                 <a:latin typeface="+mj-lt"/>
               </a:rPr>
-              <a:t>Adding </a:t>
-            </a:r>
-            <a:r>
-              <a:rPr lang="en-US" sz="2400" dirty="0" smtClean="0">
-                <a:latin typeface="+mj-lt"/>
-              </a:rPr>
-              <a:t>cyber-security incurs </a:t>
-            </a:r>
-            <a:r>
-              <a:rPr lang="en-US" sz="2400" dirty="0">
-                <a:latin typeface="+mj-lt"/>
-              </a:rPr>
-              <a:t>runtime </a:t>
+              <a:t>Adding cyber-security incurs runtime </a:t>
             </a:r>
             <a:r>
               <a:rPr lang="en-US" sz="2400" b="1" dirty="0">
@@ -18132,34 +18068,20 @@
               <a:rPr lang="en-US" sz="2400" dirty="0">
                 <a:latin typeface="+mj-lt"/>
               </a:rPr>
-              <a:t> </a:t>
+              <a:t> and </a:t>
             </a:r>
             <a:r>
-              <a:rPr lang="en-US" sz="2400" dirty="0" smtClean="0">
-                <a:latin typeface="+mj-lt"/>
-              </a:rPr>
-              <a:t>and </a:t>
-            </a:r>
-            <a:r>
-              <a:rPr lang="en-US" sz="2400" b="1" dirty="0" smtClean="0">
+              <a:rPr lang="en-US" sz="2400" b="1" dirty="0">
                 <a:latin typeface="+mj-lt"/>
               </a:rPr>
               <a:t>safety issues</a:t>
             </a:r>
             <a:r>
-              <a:rPr lang="en-US" sz="2400" dirty="0" smtClean="0">
+              <a:rPr lang="en-US" sz="2400" dirty="0">
                 <a:latin typeface="+mj-lt"/>
               </a:rPr>
               <a:t>.</a:t>
             </a:r>
-            <a:endParaRPr lang="en-US" sz="2400" dirty="0">
-              <a:latin typeface="+mj-lt"/>
-            </a:endParaRPr>
-          </a:p>
-          <a:p>
-            <a:endParaRPr lang="en-US" sz="2400" dirty="0">
-              <a:latin typeface="+mj-lt"/>
-            </a:endParaRPr>
           </a:p>
         </p:txBody>
       </p:sp>
@@ -18184,7 +18106,9 @@
           <a:lstStyle/>
           <a:p>
             <a:r>
-              <a:rPr lang="en-US" sz="3200" u="none" dirty="0"/>
+              <a:rPr lang="en-US" sz="3200" u="none" dirty="0">
+                <a:latin typeface="+mj-lt"/>
+              </a:rPr>
               <a:t>INTRODUCTION</a:t>
             </a:r>
           </a:p>
@@ -18202,8 +18126,8 @@
         </p:nvSpPr>
         <p:spPr>
           <a:xfrm>
-            <a:off x="691754" y="9003252"/>
-            <a:ext cx="10194648" cy="11409661"/>
+            <a:off x="691754" y="7897780"/>
+            <a:ext cx="10194648" cy="9636868"/>
           </a:xfrm>
         </p:spPr>
         <p:txBody>
@@ -18215,17 +18139,9 @@
               <a:buChar char="•"/>
             </a:pPr>
             <a:r>
-              <a:rPr lang="en-US" dirty="0"/>
-              <a:t>Numerous software techniques that have been developed to protect cyber systems from attacks.</a:t>
-            </a:r>
-          </a:p>
-          <a:p>
-            <a:pPr marL="342900" indent="-342900">
-              <a:buFont typeface="Arial" panose="020B0604020202020204" pitchFamily="34" charset="0"/>
-              <a:buChar char="•"/>
-            </a:pPr>
-            <a:r>
-              <a:rPr lang="en-US" b="1" dirty="0"/>
+              <a:rPr lang="en-US" sz="2400" b="1" dirty="0">
+                <a:latin typeface="+mj-lt"/>
+              </a:rPr>
               <a:t>System-level software security techniques: </a:t>
             </a:r>
           </a:p>
@@ -18235,8 +18151,8 @@
               <a:buChar char="•"/>
             </a:pPr>
             <a:r>
-              <a:rPr lang="en-US" dirty="0">
-                <a:latin typeface="Times New Roman" panose="02020603050405020304" pitchFamily="18" charset="0"/>
+              <a:rPr lang="en-US" sz="2400" dirty="0">
+                <a:latin typeface="+mj-lt"/>
                 <a:cs typeface="Times New Roman" panose="02020603050405020304" pitchFamily="18" charset="0"/>
               </a:rPr>
               <a:t>Anti-virus and intrusion-detection systems.</a:t>
@@ -18245,8 +18161,8 @@
           <a:p>
             <a:pPr marL="1812222" lvl="2" indent="-342900"/>
             <a:r>
-              <a:rPr lang="en-US" dirty="0">
-                <a:latin typeface="Times New Roman" panose="02020603050405020304" pitchFamily="18" charset="0"/>
+              <a:rPr lang="en-US" sz="2400" dirty="0">
+                <a:latin typeface="+mj-lt"/>
                 <a:cs typeface="Times New Roman" panose="02020603050405020304" pitchFamily="18" charset="0"/>
               </a:rPr>
               <a:t> monitor the entire system for indications of compromise.</a:t>
@@ -18257,66 +18173,50 @@
               <a:buFont typeface="Arial" panose="020B0604020202020204" pitchFamily="34" charset="0"/>
               <a:buChar char="•"/>
             </a:pPr>
-            <a:endParaRPr lang="en-US" dirty="0"/>
+            <a:endParaRPr lang="en-US" sz="2400" dirty="0">
+              <a:latin typeface="+mj-lt"/>
+            </a:endParaRPr>
           </a:p>
           <a:p>
             <a:pPr marL="342900" indent="-342900">
               <a:buFont typeface="Arial" panose="020B0604020202020204" pitchFamily="34" charset="0"/>
               <a:buChar char="•"/>
             </a:pPr>
-            <a:endParaRPr lang="en-US" dirty="0"/>
+            <a:endParaRPr lang="en-US" sz="2400" dirty="0">
+              <a:latin typeface="+mj-lt"/>
+            </a:endParaRPr>
           </a:p>
           <a:p>
             <a:pPr marL="342900" indent="-342900">
               <a:buFont typeface="Arial" panose="020B0604020202020204" pitchFamily="34" charset="0"/>
               <a:buChar char="•"/>
             </a:pPr>
-            <a:endParaRPr lang="en-US" dirty="0"/>
+            <a:endParaRPr lang="en-US" sz="2400" dirty="0">
+              <a:latin typeface="+mj-lt"/>
+            </a:endParaRPr>
           </a:p>
           <a:p>
             <a:pPr marL="342900" indent="-342900">
               <a:buFont typeface="Arial" panose="020B0604020202020204" pitchFamily="34" charset="0"/>
               <a:buChar char="•"/>
             </a:pPr>
-            <a:endParaRPr lang="en-US" dirty="0"/>
+            <a:endParaRPr lang="en-US" sz="2400" dirty="0">
+              <a:latin typeface="+mj-lt"/>
+            </a:endParaRPr>
           </a:p>
           <a:p>
             <a:pPr marL="342900" indent="-342900">
               <a:buFont typeface="Arial" panose="020B0604020202020204" pitchFamily="34" charset="0"/>
               <a:buChar char="•"/>
             </a:pPr>
-            <a:endParaRPr lang="en-US" dirty="0"/>
+            <a:endParaRPr lang="en-US" sz="2400" dirty="0">
+              <a:latin typeface="+mj-lt"/>
+            </a:endParaRPr>
           </a:p>
           <a:p>
-            <a:pPr marL="342900" indent="-342900">
-              <a:buFont typeface="Arial" panose="020B0604020202020204" pitchFamily="34" charset="0"/>
-              <a:buChar char="•"/>
-            </a:pPr>
-            <a:endParaRPr lang="en-US" dirty="0"/>
-          </a:p>
-          <a:p>
-            <a:pPr marL="342900" indent="-342900">
-              <a:buFont typeface="Arial" panose="020B0604020202020204" pitchFamily="34" charset="0"/>
-              <a:buChar char="•"/>
-            </a:pPr>
-            <a:endParaRPr lang="en-US" dirty="0"/>
-          </a:p>
-          <a:p>
-            <a:endParaRPr lang="en-US" dirty="0"/>
-          </a:p>
-          <a:p>
-            <a:pPr marL="342900" indent="-342900">
-              <a:buFont typeface="Arial" panose="020B0604020202020204" pitchFamily="34" charset="0"/>
-              <a:buChar char="•"/>
-            </a:pPr>
-            <a:endParaRPr lang="en-US" dirty="0"/>
-          </a:p>
-          <a:p>
-            <a:pPr marL="342900" indent="-342900">
-              <a:buFont typeface="Arial" panose="020B0604020202020204" pitchFamily="34" charset="0"/>
-              <a:buChar char="•"/>
-            </a:pPr>
-            <a:endParaRPr lang="en-US" dirty="0"/>
+            <a:endParaRPr lang="en-US" sz="2400" dirty="0">
+              <a:latin typeface="+mj-lt"/>
+            </a:endParaRPr>
           </a:p>
           <a:p>
             <a:pPr marL="342900" indent="-342900">
@@ -18324,7 +18224,9 @@
               <a:buChar char="•"/>
             </a:pPr>
             <a:r>
-              <a:rPr lang="en-US" b="1" dirty="0"/>
+              <a:rPr lang="en-US" sz="2400" b="1" dirty="0">
+                <a:latin typeface="+mj-lt"/>
+              </a:rPr>
               <a:t>Application-level software security techniques:</a:t>
             </a:r>
           </a:p>
@@ -18334,8 +18236,8 @@
               <a:buChar char="•"/>
             </a:pPr>
             <a:r>
-              <a:rPr lang="en-US" dirty="0">
-                <a:latin typeface="Times New Roman" panose="02020603050405020304" pitchFamily="18" charset="0"/>
+              <a:rPr lang="en-US" sz="2400" dirty="0">
+                <a:latin typeface="+mj-lt"/>
                 <a:cs typeface="Times New Roman" panose="02020603050405020304" pitchFamily="18" charset="0"/>
               </a:rPr>
               <a:t>Control Flow Integrity (CFI):</a:t>
@@ -18344,8 +18246,8 @@
           <a:p>
             <a:pPr marL="1812222" lvl="2" indent="-342900"/>
             <a:r>
-              <a:rPr lang="en-US" dirty="0">
-                <a:latin typeface="Times New Roman" panose="02020603050405020304" pitchFamily="18" charset="0"/>
+              <a:rPr lang="en-US" sz="2400" dirty="0">
+                <a:latin typeface="+mj-lt"/>
                 <a:cs typeface="Times New Roman" panose="02020603050405020304" pitchFamily="18" charset="0"/>
               </a:rPr>
               <a:t>Instruments the application to enforce the intended control flow at run time.</a:t>
@@ -18354,14 +18256,16 @@
           <a:p>
             <a:pPr marL="1812222" lvl="2" indent="-342900"/>
             <a:r>
-              <a:rPr lang="en-US" dirty="0">
-                <a:latin typeface="Times New Roman" panose="02020603050405020304" pitchFamily="18" charset="0"/>
+              <a:rPr lang="en-US" sz="2400" dirty="0">
+                <a:latin typeface="+mj-lt"/>
                 <a:cs typeface="Times New Roman" panose="02020603050405020304" pitchFamily="18" charset="0"/>
               </a:rPr>
-              <a:t>The overhead on an application can vary depending on the inputs it processes</a:t>
+              <a:t>The overhead on an application varies depending on the inputs it processes</a:t>
             </a:r>
             <a:r>
-              <a:rPr lang="en-US" dirty="0"/>
+              <a:rPr lang="en-US" sz="2400" dirty="0">
+                <a:latin typeface="+mj-lt"/>
+              </a:rPr>
               <a:t>.</a:t>
             </a:r>
           </a:p>
@@ -18371,43 +18275,39 @@
               <a:buChar char="•"/>
             </a:pPr>
             <a:r>
-              <a:rPr lang="en-US" dirty="0">
-                <a:latin typeface="Times New Roman" panose="02020603050405020304" pitchFamily="18" charset="0"/>
+              <a:rPr lang="en-US" sz="2400" dirty="0">
+                <a:latin typeface="+mj-lt"/>
                 <a:cs typeface="Times New Roman" panose="02020603050405020304" pitchFamily="18" charset="0"/>
               </a:rPr>
               <a:t>The N-variant system (</a:t>
             </a:r>
             <a:r>
-              <a:rPr lang="en-US" i="1" dirty="0" smtClean="0">
-                <a:latin typeface="Times New Roman" panose="02020603050405020304" pitchFamily="18" charset="0"/>
+              <a:rPr lang="en-US" sz="2400" i="1" dirty="0">
+                <a:latin typeface="+mj-lt"/>
                 <a:cs typeface="Times New Roman" panose="02020603050405020304" pitchFamily="18" charset="0"/>
               </a:rPr>
-              <a:t>DoubleHelix</a:t>
+              <a:t>Double Helix</a:t>
             </a:r>
             <a:r>
-              <a:rPr lang="en-US" baseline="30000" dirty="0" smtClean="0">
-                <a:latin typeface="Times New Roman" panose="02020603050405020304" pitchFamily="18" charset="0"/>
+              <a:rPr lang="en-US" sz="2400" baseline="30000" dirty="0">
+                <a:latin typeface="+mj-lt"/>
                 <a:cs typeface="Times New Roman" panose="02020603050405020304" pitchFamily="18" charset="0"/>
               </a:rPr>
               <a:t>1</a:t>
             </a:r>
             <a:r>
-              <a:rPr lang="en-US" dirty="0" smtClean="0">
-                <a:latin typeface="Times New Roman" panose="02020603050405020304" pitchFamily="18" charset="0"/>
+              <a:rPr lang="en-US" sz="2400" dirty="0">
+                <a:latin typeface="+mj-lt"/>
                 <a:cs typeface="Times New Roman" panose="02020603050405020304" pitchFamily="18" charset="0"/>
               </a:rPr>
               <a:t>):</a:t>
             </a:r>
-            <a:endParaRPr lang="en-US" dirty="0">
-              <a:latin typeface="Times New Roman" panose="02020603050405020304" pitchFamily="18" charset="0"/>
-              <a:cs typeface="Times New Roman" panose="02020603050405020304" pitchFamily="18" charset="0"/>
-            </a:endParaRPr>
           </a:p>
           <a:p>
             <a:pPr marL="1812222" lvl="2" indent="-342900"/>
             <a:r>
-              <a:rPr lang="en-US" dirty="0">
-                <a:latin typeface="Times New Roman" panose="02020603050405020304" pitchFamily="18" charset="0"/>
+              <a:rPr lang="en-US" sz="2400" dirty="0">
+                <a:latin typeface="+mj-lt"/>
                 <a:cs typeface="Times New Roman" panose="02020603050405020304" pitchFamily="18" charset="0"/>
               </a:rPr>
               <a:t>Employs the systematic application of artificial diversity to prevent large classes of attacks.</a:t>
@@ -18416,112 +18316,22 @@
           <a:p>
             <a:pPr marL="1812222" lvl="2" indent="-342900"/>
             <a:r>
-              <a:rPr lang="en-US" dirty="0">
-                <a:latin typeface="Times New Roman" panose="02020603050405020304" pitchFamily="18" charset="0"/>
+              <a:rPr lang="en-US" sz="2400" dirty="0">
+                <a:latin typeface="+mj-lt"/>
                 <a:cs typeface="Times New Roman" panose="02020603050405020304" pitchFamily="18" charset="0"/>
               </a:rPr>
-              <a:t>Provides formal proofs that </a:t>
-            </a:r>
-            <a:r>
-              <a:rPr lang="en-US" dirty="0" smtClean="0">
-                <a:latin typeface="Times New Roman" panose="02020603050405020304" pitchFamily="18" charset="0"/>
-                <a:cs typeface="Times New Roman" panose="02020603050405020304" pitchFamily="18" charset="0"/>
-              </a:rPr>
-              <a:t>certain classes </a:t>
-            </a:r>
-            <a:r>
-              <a:rPr lang="en-US" dirty="0">
-                <a:latin typeface="Times New Roman" panose="02020603050405020304" pitchFamily="18" charset="0"/>
-                <a:cs typeface="Times New Roman" panose="02020603050405020304" pitchFamily="18" charset="0"/>
-              </a:rPr>
-              <a:t>of attacks are not possible and </a:t>
-            </a:r>
-            <a:r>
-              <a:rPr lang="en-US" dirty="0" smtClean="0">
-                <a:latin typeface="Times New Roman" panose="02020603050405020304" pitchFamily="18" charset="0"/>
-                <a:cs typeface="Times New Roman" panose="02020603050405020304" pitchFamily="18" charset="0"/>
-              </a:rPr>
-              <a:t>system can </a:t>
-            </a:r>
-            <a:r>
-              <a:rPr lang="en-US" dirty="0">
-                <a:latin typeface="Times New Roman" panose="02020603050405020304" pitchFamily="18" charset="0"/>
-                <a:cs typeface="Times New Roman" panose="02020603050405020304" pitchFamily="18" charset="0"/>
-              </a:rPr>
-              <a:t>recover from an attack and continue operation.</a:t>
+              <a:t>Provides formal proofs that certain classes of attacks are not possible and system can recover from attacks and continue operation.</a:t>
             </a:r>
           </a:p>
           <a:p>
             <a:pPr marL="1812222" lvl="2" indent="-342900"/>
             <a:r>
-              <a:rPr lang="en-US" dirty="0">
-                <a:latin typeface="Times New Roman" panose="02020603050405020304" pitchFamily="18" charset="0"/>
+              <a:rPr lang="en-US" sz="2400" dirty="0">
+                <a:latin typeface="+mj-lt"/>
                 <a:cs typeface="Times New Roman" panose="02020603050405020304" pitchFamily="18" charset="0"/>
               </a:rPr>
               <a:t>The performance overheads can reach up to 400%.</a:t>
             </a:r>
-          </a:p>
-          <a:p>
-            <a:endParaRPr lang="en-US" dirty="0"/>
-          </a:p>
-          <a:p>
-            <a:pPr marL="342900" indent="-342900">
-              <a:buFont typeface="Arial" panose="020B0604020202020204" pitchFamily="34" charset="0"/>
-              <a:buChar char="•"/>
-            </a:pPr>
-            <a:endParaRPr lang="en-US" dirty="0"/>
-          </a:p>
-          <a:p>
-            <a:pPr marL="342900" indent="-342900">
-              <a:buFont typeface="Arial" panose="020B0604020202020204" pitchFamily="34" charset="0"/>
-              <a:buChar char="•"/>
-            </a:pPr>
-            <a:endParaRPr lang="en-US" dirty="0"/>
-          </a:p>
-          <a:p>
-            <a:pPr marL="342900" indent="-342900">
-              <a:buFont typeface="Arial" panose="020B0604020202020204" pitchFamily="34" charset="0"/>
-              <a:buChar char="•"/>
-            </a:pPr>
-            <a:endParaRPr lang="en-US" dirty="0"/>
-          </a:p>
-          <a:p>
-            <a:pPr marL="342900" indent="-342900">
-              <a:buFont typeface="Arial" panose="020B0604020202020204" pitchFamily="34" charset="0"/>
-              <a:buChar char="•"/>
-            </a:pPr>
-            <a:endParaRPr lang="en-US" dirty="0"/>
-          </a:p>
-          <a:p>
-            <a:pPr marL="342900" indent="-342900">
-              <a:buFont typeface="Arial" panose="020B0604020202020204" pitchFamily="34" charset="0"/>
-              <a:buChar char="•"/>
-            </a:pPr>
-            <a:endParaRPr lang="en-US" dirty="0"/>
-          </a:p>
-          <a:p>
-            <a:pPr marL="342900" indent="-342900">
-              <a:buFont typeface="Arial" panose="020B0604020202020204" pitchFamily="34" charset="0"/>
-              <a:buChar char="•"/>
-            </a:pPr>
-            <a:endParaRPr lang="en-US" dirty="0"/>
-          </a:p>
-          <a:p>
-            <a:pPr marL="342900" indent="-342900">
-              <a:buFont typeface="Arial" panose="020B0604020202020204" pitchFamily="34" charset="0"/>
-              <a:buChar char="•"/>
-            </a:pPr>
-            <a:endParaRPr lang="en-US" dirty="0"/>
-          </a:p>
-          <a:p>
-            <a:pPr marL="342900" indent="-342900">
-              <a:buFont typeface="Arial" panose="020B0604020202020204" pitchFamily="34" charset="0"/>
-              <a:buChar char="•"/>
-            </a:pPr>
-            <a:endParaRPr lang="en-US" dirty="0"/>
-          </a:p>
-          <a:p>
-            <a:endParaRPr lang="en-US" dirty="0"/>
           </a:p>
         </p:txBody>
       </p:sp>
@@ -18537,8 +18347,8 @@
         </p:nvSpPr>
         <p:spPr>
           <a:xfrm>
-            <a:off x="710414" y="8505426"/>
-            <a:ext cx="10179844" cy="531993"/>
+            <a:off x="710414" y="7381082"/>
+            <a:ext cx="10179844" cy="624326"/>
           </a:xfrm>
         </p:spPr>
         <p:txBody>
@@ -18546,8 +18356,10 @@
           <a:lstStyle/>
           <a:p>
             <a:r>
-              <a:rPr lang="en-US" dirty="0"/>
-              <a:t>MOTIVATION</a:t>
+              <a:rPr lang="en-US" sz="3200" dirty="0">
+                <a:latin typeface="+mj-lt"/>
+              </a:rPr>
+              <a:t>CYBER-SECURITY TECHNIQUES</a:t>
             </a:r>
           </a:p>
         </p:txBody>
@@ -18564,21 +18376,23 @@
         </p:nvSpPr>
         <p:spPr>
           <a:xfrm>
-            <a:off x="11365707" y="9869008"/>
-            <a:ext cx="10178651" cy="606704"/>
+            <a:off x="11383292" y="9886593"/>
+            <a:ext cx="10178651" cy="699037"/>
           </a:xfrm>
         </p:spPr>
         <p:txBody>
           <a:bodyPr/>
           <a:lstStyle/>
           <a:p>
-            <a:pPr marL="285750" indent="-285750">
+            <a:pPr marL="342900" indent="-342900">
               <a:buFont typeface="Arial" panose="020B0604020202020204" pitchFamily="34" charset="0"/>
               <a:buChar char="•"/>
             </a:pPr>
             <a:r>
-              <a:rPr lang="en-US" dirty="0"/>
-              <a:t>The online controller adaptation uses Model Predictive Control (MPC)</a:t>
+              <a:rPr lang="en-US" sz="2400" dirty="0">
+                <a:latin typeface="+mj-lt"/>
+              </a:rPr>
+              <a:t>Using Model Predictive Control (MPC).</a:t>
             </a:r>
           </a:p>
         </p:txBody>
@@ -18595,8 +18409,8 @@
         </p:nvSpPr>
         <p:spPr>
           <a:xfrm>
-            <a:off x="11365707" y="9208323"/>
-            <a:ext cx="10178651" cy="531993"/>
+            <a:off x="11365707" y="9273370"/>
+            <a:ext cx="10178651" cy="624326"/>
           </a:xfrm>
         </p:spPr>
         <p:txBody>
@@ -18604,14 +18418,16 @@
           <a:lstStyle/>
           <a:p>
             <a:r>
-              <a:rPr lang="en-US" dirty="0"/>
+              <a:rPr lang="en-US" sz="3200" dirty="0">
+                <a:latin typeface="+mj-lt"/>
+              </a:rPr>
               <a:t>ONLINE CONTROLLER ADAPTATION</a:t>
             </a:r>
           </a:p>
         </p:txBody>
       </p:sp>
-      <mc:AlternateContent xmlns:mc="http://schemas.openxmlformats.org/markup-compatibility/2006" xmlns:a14="http://schemas.microsoft.com/office/drawing/2010/main">
-        <mc:Choice Requires="a14">
+      <mc:AlternateContent xmlns:mc="http://schemas.openxmlformats.org/markup-compatibility/2006">
+        <mc:Choice xmlns:a14="http://schemas.microsoft.com/office/drawing/2010/main" Requires="a14">
           <p:sp>
             <p:nvSpPr>
               <p:cNvPr id="8" name="Text Placeholder 7"/>
@@ -18624,8 +18440,8 @@
             </p:nvSpPr>
             <p:spPr>
               <a:xfrm>
-                <a:off x="11371661" y="4329508"/>
-                <a:ext cx="10178651" cy="2601096"/>
+                <a:off x="11371661" y="4329509"/>
+                <a:ext cx="10178651" cy="5648084"/>
               </a:xfrm>
             </p:spPr>
             <p:txBody>
@@ -18637,38 +18453,40 @@
                   <a:buChar char="•"/>
                 </a:pPr>
                 <a:r>
-                  <a:rPr lang="en-US" dirty="0"/>
+                  <a:rPr lang="en-US" sz="2400" dirty="0">
+                    <a:latin typeface="+mj-lt"/>
+                  </a:rPr>
                   <a:t>An autonomous vehicle (AV) is tasked to complete a mission over an obstacle populated environment </a:t>
                 </a:r>
                 <a14:m>
                   <m:oMath xmlns:m="http://schemas.openxmlformats.org/officeDocument/2006/math">
                     <m:r>
-                      <a:rPr lang="en-US" i="1">
-                        <a:latin typeface="Cambria Math" panose="02040503050406030204" pitchFamily="18" charset="0"/>
+                      <a:rPr lang="en-US" sz="2400" i="1">
+                        <a:latin typeface="+mj-lt"/>
                       </a:rPr>
                       <m:t>𝑊</m:t>
                     </m:r>
                     <m:r>
-                      <a:rPr lang="en-US" i="1">
-                        <a:latin typeface="Cambria Math" panose="02040503050406030204" pitchFamily="18" charset="0"/>
+                      <a:rPr lang="en-US" sz="2400" i="1">
+                        <a:latin typeface="+mj-lt"/>
                       </a:rPr>
                       <m:t>=</m:t>
                     </m:r>
                     <m:r>
-                      <a:rPr lang="en-US" i="1">
-                        <a:latin typeface="Cambria Math" panose="02040503050406030204" pitchFamily="18" charset="0"/>
+                      <a:rPr lang="en-US" sz="2400" i="1">
+                        <a:latin typeface="+mj-lt"/>
                       </a:rPr>
                       <m:t>𝐹</m:t>
                     </m:r>
                     <m:r>
-                      <a:rPr lang="en-US" i="1">
-                        <a:latin typeface="Cambria Math" panose="02040503050406030204" pitchFamily="18" charset="0"/>
+                      <a:rPr lang="en-US" sz="2400" i="1">
+                        <a:latin typeface="+mj-lt"/>
                       </a:rPr>
                       <m:t> ∪</m:t>
                     </m:r>
                     <m:r>
-                      <a:rPr lang="en-US" i="1">
-                        <a:latin typeface="Cambria Math" panose="02040503050406030204" pitchFamily="18" charset="0"/>
+                      <a:rPr lang="en-US" sz="2400" i="1">
+                        <a:latin typeface="+mj-lt"/>
                         <a:ea typeface="Cambria Math" panose="02040503050406030204" pitchFamily="18" charset="0"/>
                       </a:rPr>
                       <m:t>𝑂</m:t>
@@ -18676,28 +18494,44 @@
                   </m:oMath>
                 </a14:m>
                 <a:r>
-                  <a:rPr lang="en-US" dirty="0"/>
-                  <a:t> in which </a:t>
+                  <a:rPr lang="en-US" sz="2400" dirty="0">
+                    <a:latin typeface="+mj-lt"/>
+                  </a:rPr>
+                  <a:t> </a:t>
+                </a:r>
+              </a:p>
+              <a:p>
+                <a:pPr marL="285750" indent="-285750">
+                  <a:buFont typeface="Arial" panose="020B0604020202020204" pitchFamily="34" charset="0"/>
+                  <a:buChar char="•"/>
+                </a:pPr>
+                <a:r>
+                  <a:rPr lang="en-US" sz="2400" dirty="0">
+                    <a:latin typeface="+mj-lt"/>
+                  </a:rPr>
+                  <a:t>The set </a:t>
                 </a:r>
                 <a14:m>
                   <m:oMath xmlns:m="http://schemas.openxmlformats.org/officeDocument/2006/math">
                     <m:r>
-                      <a:rPr lang="en-US" i="1">
-                        <a:latin typeface="Cambria Math" panose="02040503050406030204" pitchFamily="18" charset="0"/>
+                      <a:rPr lang="en-US" sz="2400" i="1">
+                        <a:latin typeface="+mj-lt"/>
                       </a:rPr>
                       <m:t>𝐹</m:t>
                     </m:r>
                   </m:oMath>
                 </a14:m>
                 <a:r>
-                  <a:rPr lang="en-US" dirty="0"/>
+                  <a:rPr lang="en-US" sz="2400" dirty="0">
+                    <a:latin typeface="+mj-lt"/>
+                  </a:rPr>
                   <a:t> represents the obstacle-free region of the environment and vice versa </a:t>
                 </a:r>
                 <a14:m>
                   <m:oMath xmlns:m="http://schemas.openxmlformats.org/officeDocument/2006/math">
                     <m:r>
-                      <a:rPr lang="en-US" i="1">
-                        <a:latin typeface="Cambria Math" panose="02040503050406030204" pitchFamily="18" charset="0"/>
+                      <a:rPr lang="en-US" sz="2400" i="1">
+                        <a:latin typeface="+mj-lt"/>
                         <a:ea typeface="Cambria Math" panose="02040503050406030204" pitchFamily="18" charset="0"/>
                       </a:rPr>
                       <m:t>𝑂</m:t>
@@ -18705,80 +18539,125 @@
                   </m:oMath>
                 </a14:m>
                 <a:r>
-                  <a:rPr lang="en-US" dirty="0"/>
-                  <a:t> is the region occupied by obstacles. The AV discrete dynamical model is shown below where delays, </a:t>
+                  <a:rPr lang="en-US" sz="2400" dirty="0">
+                    <a:latin typeface="+mj-lt"/>
+                  </a:rPr>
+                  <a:t> is the region occupied by obstacles. </a:t>
+                </a:r>
+                <a:endParaRPr lang="ar-EG" sz="2400" dirty="0">
+                  <a:latin typeface="+mj-lt"/>
+                </a:endParaRPr>
+              </a:p>
+              <a:p>
+                <a:pPr marL="285750" indent="-285750">
+                  <a:buFont typeface="Arial" panose="020B0604020202020204" pitchFamily="34" charset="0"/>
+                  <a:buChar char="•"/>
+                </a:pPr>
+                <a:r>
+                  <a:rPr lang="en-US" sz="2400" dirty="0">
+                    <a:latin typeface="+mj-lt"/>
+                  </a:rPr>
+                  <a:t>The discrete dynamical model of the AV:</a:t>
+                </a:r>
+              </a:p>
+              <a:p>
+                <a:pPr marL="285750" indent="-285750">
+                  <a:buFont typeface="Arial" panose="020B0604020202020204" pitchFamily="34" charset="0"/>
+                  <a:buChar char="•"/>
+                </a:pPr>
+                <a:endParaRPr lang="en-US" sz="2400" dirty="0">
+                  <a:latin typeface="+mj-lt"/>
+                </a:endParaRPr>
+              </a:p>
+              <a:p>
+                <a:pPr marL="285750" indent="-285750">
+                  <a:buFont typeface="Arial" panose="020B0604020202020204" pitchFamily="34" charset="0"/>
+                  <a:buChar char="•"/>
+                </a:pPr>
+                <a:endParaRPr lang="en-US" sz="2400" dirty="0">
+                  <a:latin typeface="+mj-lt"/>
+                </a:endParaRPr>
+              </a:p>
+              <a:p>
+                <a:pPr marL="285750" indent="-285750">
+                  <a:buFont typeface="Arial" panose="020B0604020202020204" pitchFamily="34" charset="0"/>
+                  <a:buChar char="•"/>
+                </a:pPr>
+                <a:endParaRPr lang="en-US" sz="2400" dirty="0">
+                  <a:latin typeface="+mj-lt"/>
+                </a:endParaRPr>
+              </a:p>
+              <a:p>
+                <a:pPr marL="285750" indent="-285750">
+                  <a:buFont typeface="Arial" panose="020B0604020202020204" pitchFamily="34" charset="0"/>
+                  <a:buChar char="•"/>
+                </a:pPr>
+                <a:r>
+                  <a:rPr lang="en-US" sz="2400" dirty="0">
+                    <a:latin typeface="+mj-lt"/>
+                  </a:rPr>
+                  <a:t> Given the constraints, the current state of the system </a:t>
                 </a:r>
                 <a14:m>
                   <m:oMath xmlns:m="http://schemas.openxmlformats.org/officeDocument/2006/math">
                     <m:r>
-                      <a:rPr lang="en-US" i="1">
-                        <a:latin typeface="Cambria Math" panose="02040503050406030204" pitchFamily="18" charset="0"/>
-                        <a:ea typeface="Cambria Math" panose="02040503050406030204" pitchFamily="18" charset="0"/>
-                      </a:rPr>
-                      <m:t>𝛿</m:t>
-                    </m:r>
-                  </m:oMath>
-                </a14:m>
-                <a:r>
-                  <a:rPr lang="en-US" dirty="0"/>
-                  <a:t>, are due to security mechanisms running on the controller to protect the system against malicious cyber-attacks. Given the constraints, the current state of the system </a:t>
-                </a:r>
-                <a14:m>
-                  <m:oMath xmlns:m="http://schemas.openxmlformats.org/officeDocument/2006/math">
-                    <m:r>
-                      <a:rPr lang="en-US" i="1">
-                        <a:latin typeface="Cambria Math" panose="02040503050406030204" pitchFamily="18" charset="0"/>
+                      <a:rPr lang="en-US" sz="2400" i="1">
+                        <a:latin typeface="+mj-lt"/>
                       </a:rPr>
                       <m:t>𝑥</m:t>
                     </m:r>
                   </m:oMath>
                 </a14:m>
                 <a:r>
-                  <a:rPr lang="en-US" dirty="0"/>
+                  <a:rPr lang="en-US" sz="2400" dirty="0">
+                    <a:latin typeface="+mj-lt"/>
+                  </a:rPr>
                   <a:t>, the desired input </a:t>
                 </a:r>
                 <a14:m>
                   <m:oMath xmlns:m="http://schemas.openxmlformats.org/officeDocument/2006/math">
                     <m:r>
-                      <a:rPr lang="en-US" i="1">
-                        <a:latin typeface="Cambria Math" panose="02040503050406030204" pitchFamily="18" charset="0"/>
+                      <a:rPr lang="en-US" sz="2400" i="1">
+                        <a:latin typeface="+mj-lt"/>
                       </a:rPr>
                       <m:t>𝑢</m:t>
                     </m:r>
                     <m:r>
-                      <a:rPr lang="en-US" i="1">
-                        <a:latin typeface="Cambria Math" panose="02040503050406030204" pitchFamily="18" charset="0"/>
+                      <a:rPr lang="en-US" sz="2400" i="1">
+                        <a:latin typeface="+mj-lt"/>
                       </a:rPr>
                       <m:t> </m:t>
                     </m:r>
                   </m:oMath>
                 </a14:m>
                 <a:r>
-                  <a:rPr lang="en-US" dirty="0"/>
-                  <a:t>with no delay, and the maximum delay that we can expect </a:t>
+                  <a:rPr lang="en-US" sz="2400" dirty="0">
+                    <a:latin typeface="+mj-lt"/>
+                  </a:rPr>
+                  <a:t>with no delay, and the maximum expected delay </a:t>
                 </a:r>
                 <a14:m>
                   <m:oMath xmlns:m="http://schemas.openxmlformats.org/officeDocument/2006/math">
                     <m:sSub>
                       <m:sSubPr>
                         <m:ctrlPr>
-                          <a:rPr lang="en-US" i="1">
-                            <a:latin typeface="Cambria Math" charset="0"/>
+                          <a:rPr lang="en-US" sz="2400" i="1">
+                            <a:latin typeface="+mj-lt"/>
                           </a:rPr>
                         </m:ctrlPr>
                       </m:sSubPr>
                       <m:e>
                         <m:r>
-                          <a:rPr lang="en-US" i="1">
-                            <a:latin typeface="Cambria Math" panose="02040503050406030204" pitchFamily="18" charset="0"/>
+                          <a:rPr lang="en-US" sz="2400" i="1">
+                            <a:latin typeface="+mj-lt"/>
                           </a:rPr>
                           <m:t>𝛿</m:t>
                         </m:r>
                       </m:e>
                       <m:sub>
                         <m:r>
-                          <a:rPr lang="en-US" i="1">
-                            <a:latin typeface="Cambria Math" panose="02040503050406030204" pitchFamily="18" charset="0"/>
+                          <a:rPr lang="en-US" sz="2400" i="1">
+                            <a:latin typeface="+mj-lt"/>
                           </a:rPr>
                           <m:t>𝑚𝑎𝑥</m:t>
                         </m:r>
@@ -18787,8 +18666,22 @@
                   </m:oMath>
                 </a14:m>
                 <a:r>
-                  <a:rPr lang="en-US" dirty="0"/>
-                  <a:t> the objective is to find a control policy </a:t>
+                  <a:rPr lang="en-US" sz="2400" dirty="0">
+                    <a:latin typeface="+mj-lt"/>
+                  </a:rPr>
+                  <a:t> the objective is to find a </a:t>
+                </a:r>
+                <a:r>
+                  <a:rPr lang="en-US" sz="2400" b="1" dirty="0">
+                    <a:latin typeface="+mj-lt"/>
+                  </a:rPr>
+                  <a:t>control policy</a:t>
+                </a:r>
+                <a:r>
+                  <a:rPr lang="en-US" sz="2400" dirty="0">
+                    <a:latin typeface="+mj-lt"/>
+                  </a:rPr>
+                  <a:t> </a:t>
                 </a:r>
                 <a14:m>
                   <m:oMath xmlns:m="http://schemas.openxmlformats.org/officeDocument/2006/math">
@@ -18796,63 +18689,65 @@
                       <m:rPr>
                         <m:sty m:val="p"/>
                       </m:rPr>
-                      <a:rPr lang="en-US">
-                        <a:latin typeface="Cambria Math" panose="02040503050406030204" pitchFamily="18" charset="0"/>
+                      <a:rPr lang="en-US" sz="2400">
+                        <a:latin typeface="+mj-lt"/>
                       </a:rPr>
                       <m:t>u</m:t>
                     </m:r>
                     <m:r>
-                      <a:rPr lang="en-US" i="1">
-                        <a:latin typeface="Cambria Math" panose="02040503050406030204" pitchFamily="18" charset="0"/>
+                      <a:rPr lang="en-US" sz="2400" i="1">
+                        <a:latin typeface="+mj-lt"/>
                       </a:rPr>
                       <m:t>̂</m:t>
                     </m:r>
                     <m:r>
-                      <a:rPr lang="en-US" i="1">
-                        <a:latin typeface="Cambria Math" panose="02040503050406030204" pitchFamily="18" charset="0"/>
+                      <a:rPr lang="en-US" sz="2400" i="1">
+                        <a:latin typeface="+mj-lt"/>
                       </a:rPr>
                       <m:t>=</m:t>
                     </m:r>
                     <m:r>
-                      <a:rPr lang="en-US" i="1">
-                        <a:latin typeface="Cambria Math" panose="02040503050406030204" pitchFamily="18" charset="0"/>
+                      <a:rPr lang="en-US" sz="2400" i="1">
+                        <a:latin typeface="+mj-lt"/>
                       </a:rPr>
                       <m:t>𝑓</m:t>
                     </m:r>
                     <m:r>
-                      <a:rPr lang="en-US" i="1">
-                        <a:latin typeface="Cambria Math" panose="02040503050406030204" pitchFamily="18" charset="0"/>
+                      <a:rPr lang="en-US" sz="2400" i="1">
+                        <a:latin typeface="+mj-lt"/>
                       </a:rPr>
                       <m:t>(</m:t>
                     </m:r>
                     <m:r>
-                      <a:rPr lang="en-US" i="1">
-                        <a:latin typeface="Cambria Math" panose="02040503050406030204" pitchFamily="18" charset="0"/>
+                      <a:rPr lang="en-US" sz="2400" i="1">
+                        <a:latin typeface="+mj-lt"/>
                       </a:rPr>
                       <m:t>𝑥</m:t>
                     </m:r>
                     <m:r>
-                      <a:rPr lang="en-US" i="1">
-                        <a:latin typeface="Cambria Math" panose="02040503050406030204" pitchFamily="18" charset="0"/>
+                      <a:rPr lang="en-US" sz="2400" i="1">
+                        <a:latin typeface="+mj-lt"/>
                       </a:rPr>
                       <m:t>,</m:t>
                     </m:r>
                     <m:r>
-                      <a:rPr lang="en-US" i="1">
-                        <a:latin typeface="Cambria Math" panose="02040503050406030204" pitchFamily="18" charset="0"/>
+                      <a:rPr lang="en-US" sz="2400" i="1">
+                        <a:latin typeface="+mj-lt"/>
                       </a:rPr>
                       <m:t>𝑢</m:t>
                     </m:r>
                     <m:r>
-                      <a:rPr lang="en-US" i="1">
-                        <a:latin typeface="Cambria Math" panose="02040503050406030204" pitchFamily="18" charset="0"/>
+                      <a:rPr lang="en-US" sz="2400" i="1">
+                        <a:latin typeface="+mj-lt"/>
                       </a:rPr>
                       <m:t>,</m:t>
                     </m:r>
                   </m:oMath>
                 </a14:m>
                 <a:r>
-                  <a:rPr lang="en-US" dirty="0"/>
+                  <a:rPr lang="en-US" sz="2400" dirty="0">
+                    <a:latin typeface="+mj-lt"/>
+                  </a:rPr>
                   <a:t> </a:t>
                 </a:r>
                 <a14:m>
@@ -18860,31 +18755,31 @@
                     <m:sSub>
                       <m:sSubPr>
                         <m:ctrlPr>
-                          <a:rPr lang="en-US" i="1">
-                            <a:latin typeface="Cambria Math" charset="0"/>
+                          <a:rPr lang="en-US" sz="2400" i="1">
+                            <a:latin typeface="+mj-lt"/>
                           </a:rPr>
                         </m:ctrlPr>
                       </m:sSubPr>
                       <m:e>
                         <m:r>
-                          <a:rPr lang="en-US" i="1">
-                            <a:latin typeface="Cambria Math" panose="02040503050406030204" pitchFamily="18" charset="0"/>
+                          <a:rPr lang="en-US" sz="2400" i="1">
+                            <a:latin typeface="+mj-lt"/>
                           </a:rPr>
                           <m:t>𝛿</m:t>
                         </m:r>
                       </m:e>
                       <m:sub>
                         <m:r>
-                          <a:rPr lang="en-US" i="1">
-                            <a:latin typeface="Cambria Math" panose="02040503050406030204" pitchFamily="18" charset="0"/>
+                          <a:rPr lang="en-US" sz="2400" i="1">
+                            <a:latin typeface="+mj-lt"/>
                           </a:rPr>
                           <m:t>𝑚𝑎𝑥</m:t>
                         </m:r>
                       </m:sub>
                     </m:sSub>
                     <m:r>
-                      <a:rPr lang="en-US">
-                        <a:latin typeface="Cambria Math" panose="02040503050406030204" pitchFamily="18" charset="0"/>
+                      <a:rPr lang="en-US" sz="2400">
+                        <a:latin typeface="+mj-lt"/>
                       </a:rPr>
                       <m:t>,</m:t>
                     </m:r>
@@ -18892,43 +18787,45 @@
                       <m:rPr>
                         <m:sty m:val="p"/>
                       </m:rPr>
-                      <a:rPr lang="en-US">
-                        <a:latin typeface="Cambria Math" panose="02040503050406030204" pitchFamily="18" charset="0"/>
+                      <a:rPr lang="en-US" sz="2400">
+                        <a:latin typeface="+mj-lt"/>
                       </a:rPr>
                       <m:t>t</m:t>
                     </m:r>
                     <m:r>
-                      <a:rPr lang="en-US">
-                        <a:latin typeface="Cambria Math" panose="02040503050406030204" pitchFamily="18" charset="0"/>
+                      <a:rPr lang="en-US" sz="2400">
+                        <a:latin typeface="+mj-lt"/>
                       </a:rPr>
                       <m:t>)</m:t>
                     </m:r>
                   </m:oMath>
                 </a14:m>
                 <a:r>
-                  <a:rPr lang="en-US" dirty="0"/>
+                  <a:rPr lang="en-US" sz="2400" dirty="0">
+                    <a:latin typeface="+mj-lt"/>
+                  </a:rPr>
                   <a:t> such that </a:t>
                 </a:r>
                 <a14:m>
                   <m:oMath xmlns:m="http://schemas.openxmlformats.org/officeDocument/2006/math">
                     <m:r>
-                      <a:rPr lang="en-US" i="1">
-                        <a:latin typeface="Cambria Math" panose="02040503050406030204" pitchFamily="18" charset="0"/>
+                      <a:rPr lang="en-US" sz="2400" i="1">
+                        <a:latin typeface="+mj-lt"/>
                       </a:rPr>
                       <m:t>𝑥</m:t>
                     </m:r>
                     <m:d>
                       <m:dPr>
                         <m:ctrlPr>
-                          <a:rPr lang="en-US" i="1">
-                            <a:latin typeface="Cambria Math" charset="0"/>
+                          <a:rPr lang="en-US" sz="2400" i="1">
+                            <a:latin typeface="+mj-lt"/>
                           </a:rPr>
                         </m:ctrlPr>
                       </m:dPr>
                       <m:e>
                         <m:r>
-                          <a:rPr lang="en-US" i="1">
-                            <a:latin typeface="Cambria Math" panose="02040503050406030204" pitchFamily="18" charset="0"/>
+                          <a:rPr lang="en-US" sz="2400" i="1">
+                            <a:latin typeface="+mj-lt"/>
                           </a:rPr>
                           <m:t>𝑡</m:t>
                         </m:r>
@@ -18938,8 +18835,8 @@
                       <m:rPr>
                         <m:nor/>
                       </m:rPr>
-                      <a:rPr lang="en-US">
-                        <a:latin typeface="Cambria Math" panose="02040503050406030204" pitchFamily="18" charset="0"/>
+                      <a:rPr lang="en-US" sz="2400">
+                        <a:latin typeface="+mj-lt"/>
                       </a:rPr>
                       <m:t> </m:t>
                     </m:r>
@@ -18947,12 +18844,14 @@
                       <m:rPr>
                         <m:nor/>
                       </m:rPr>
-                      <a:rPr lang="en-US" dirty="0"/>
+                      <a:rPr lang="en-US" sz="2400" dirty="0">
+                        <a:latin typeface="+mj-lt"/>
+                      </a:rPr>
                       <m:t>⊄</m:t>
                     </m:r>
                     <m:r>
-                      <a:rPr lang="en-US" dirty="0">
-                        <a:latin typeface="Cambria Math" panose="02040503050406030204" pitchFamily="18" charset="0"/>
+                      <a:rPr lang="en-US" sz="2400" dirty="0">
+                        <a:latin typeface="+mj-lt"/>
                       </a:rPr>
                       <m:t> </m:t>
                     </m:r>
@@ -18960,41 +18859,55 @@
                       <m:rPr>
                         <m:sty m:val="p"/>
                       </m:rPr>
-                      <a:rPr lang="en-US" dirty="0">
-                        <a:latin typeface="Cambria Math" panose="02040503050406030204" pitchFamily="18" charset="0"/>
+                      <a:rPr lang="en-US" sz="2400" dirty="0">
+                        <a:latin typeface="+mj-lt"/>
                       </a:rPr>
                       <m:t>O</m:t>
                     </m:r>
                     <m:r>
-                      <a:rPr lang="en-US" dirty="0">
-                        <a:latin typeface="Cambria Math" panose="02040503050406030204" pitchFamily="18" charset="0"/>
+                      <a:rPr lang="en-US" sz="2400" dirty="0">
+                        <a:latin typeface="+mj-lt"/>
                       </a:rPr>
                       <m:t>, </m:t>
                     </m:r>
                     <m:r>
-                      <a:rPr lang="en-US" i="1" dirty="0">
-                        <a:latin typeface="Cambria Math" panose="02040503050406030204" pitchFamily="18" charset="0"/>
+                      <a:rPr lang="en-US" sz="2400" i="1" dirty="0">
+                        <a:latin typeface="+mj-lt"/>
                         <a:ea typeface="Cambria Math" panose="02040503050406030204" pitchFamily="18" charset="0"/>
                       </a:rPr>
                       <m:t>∀</m:t>
                     </m:r>
                     <m:r>
-                      <a:rPr lang="en-US" i="1" dirty="0">
-                        <a:latin typeface="Cambria Math" panose="02040503050406030204" pitchFamily="18" charset="0"/>
+                      <a:rPr lang="en-US" sz="2400" i="1" dirty="0">
+                        <a:latin typeface="+mj-lt"/>
                         <a:ea typeface="Cambria Math" panose="02040503050406030204" pitchFamily="18" charset="0"/>
                       </a:rPr>
                       <m:t>𝑡</m:t>
                     </m:r>
                     <m:r>
-                      <a:rPr lang="en-US" i="1" dirty="0">
-                        <a:latin typeface="Cambria Math" panose="02040503050406030204" pitchFamily="18" charset="0"/>
+                      <a:rPr lang="en-US" sz="2400" i="1" dirty="0">
+                        <a:latin typeface="+mj-lt"/>
                         <a:ea typeface="Cambria Math" panose="02040503050406030204" pitchFamily="18" charset="0"/>
                       </a:rPr>
-                      <m:t>≥0, </m:t>
+                      <m:t>≥</m:t>
                     </m:r>
                     <m:r>
-                      <a:rPr lang="en-US" i="1" dirty="0">
-                        <a:latin typeface="Cambria Math" panose="02040503050406030204" pitchFamily="18" charset="0"/>
+                      <a:rPr lang="en-US" sz="2400" i="1" dirty="0">
+                        <a:latin typeface="+mj-lt"/>
+                        <a:ea typeface="Cambria Math" panose="02040503050406030204" pitchFamily="18" charset="0"/>
+                      </a:rPr>
+                      <m:t>0</m:t>
+                    </m:r>
+                    <m:r>
+                      <a:rPr lang="en-US" sz="2400" i="1" dirty="0">
+                        <a:latin typeface="+mj-lt"/>
+                        <a:ea typeface="Cambria Math" panose="02040503050406030204" pitchFamily="18" charset="0"/>
+                      </a:rPr>
+                      <m:t>, </m:t>
+                    </m:r>
+                    <m:r>
+                      <a:rPr lang="en-US" sz="2400" i="1" dirty="0">
+                        <a:latin typeface="+mj-lt"/>
                         <a:ea typeface="Cambria Math" panose="02040503050406030204" pitchFamily="18" charset="0"/>
                       </a:rPr>
                       <m:t>𝑥</m:t>
@@ -19002,16 +18915,16 @@
                     <m:d>
                       <m:dPr>
                         <m:ctrlPr>
-                          <a:rPr lang="en-US" i="1" dirty="0">
-                            <a:latin typeface="Cambria Math" charset="0"/>
+                          <a:rPr lang="en-US" sz="2400" i="1" dirty="0">
+                            <a:latin typeface="+mj-lt"/>
                             <a:ea typeface="Cambria Math" panose="02040503050406030204" pitchFamily="18" charset="0"/>
                           </a:rPr>
                         </m:ctrlPr>
                       </m:dPr>
                       <m:e>
                         <m:r>
-                          <a:rPr lang="en-US" i="1" dirty="0">
-                            <a:latin typeface="Cambria Math" panose="02040503050406030204" pitchFamily="18" charset="0"/>
+                          <a:rPr lang="en-US" sz="2400" i="1" dirty="0">
+                            <a:latin typeface="+mj-lt"/>
                             <a:ea typeface="Cambria Math" panose="02040503050406030204" pitchFamily="18" charset="0"/>
                           </a:rPr>
                           <m:t>0</m:t>
@@ -19019,22 +18932,22 @@
                       </m:e>
                     </m:d>
                     <m:r>
-                      <a:rPr lang="en-US" i="1" dirty="0">
-                        <a:latin typeface="Cambria Math" panose="02040503050406030204" pitchFamily="18" charset="0"/>
+                      <a:rPr lang="en-US" sz="2400" i="1" dirty="0">
+                        <a:latin typeface="+mj-lt"/>
                         <a:ea typeface="Cambria Math" panose="02040503050406030204" pitchFamily="18" charset="0"/>
                       </a:rPr>
                       <m:t>⊂</m:t>
                     </m:r>
                     <m:r>
-                      <a:rPr lang="en-US" i="1" dirty="0">
-                        <a:latin typeface="Cambria Math" panose="02040503050406030204" pitchFamily="18" charset="0"/>
+                      <a:rPr lang="en-US" sz="2400" i="1" dirty="0">
+                        <a:latin typeface="+mj-lt"/>
                         <a:ea typeface="Cambria Math" panose="02040503050406030204" pitchFamily="18" charset="0"/>
                       </a:rPr>
                       <m:t>𝐹</m:t>
                     </m:r>
                     <m:r>
-                      <a:rPr lang="en-US" i="1" dirty="0">
-                        <a:latin typeface="Cambria Math" panose="02040503050406030204" pitchFamily="18" charset="0"/>
+                      <a:rPr lang="en-US" sz="2400" i="1" dirty="0">
+                        <a:latin typeface="+mj-lt"/>
                         <a:ea typeface="Cambria Math" panose="02040503050406030204" pitchFamily="18" charset="0"/>
                       </a:rPr>
                       <m:t>.</m:t>
@@ -19042,17 +18955,21 @@
                   </m:oMath>
                 </a14:m>
                 <a:r>
-                  <a:rPr lang="en-US" dirty="0"/>
+                  <a:rPr lang="en-US" sz="2400" dirty="0">
+                    <a:latin typeface="+mj-lt"/>
+                  </a:rPr>
                   <a:t> </a:t>
                 </a:r>
               </a:p>
               <a:p>
-                <a:endParaRPr lang="en-US" dirty="0"/>
+                <a:endParaRPr lang="en-US" sz="2400" dirty="0">
+                  <a:latin typeface="+mj-lt"/>
+                </a:endParaRPr>
               </a:p>
             </p:txBody>
           </p:sp>
         </mc:Choice>
-        <mc:Fallback xmlns="">
+        <mc:Fallback>
           <p:sp>
             <p:nvSpPr>
               <p:cNvPr id="8" name="Text Placeholder 7"/>
@@ -19065,13 +18982,13 @@
             </p:nvSpPr>
             <p:spPr>
               <a:xfrm>
-                <a:off x="11371661" y="4329508"/>
-                <a:ext cx="10178651" cy="2601096"/>
+                <a:off x="11371661" y="4329509"/>
+                <a:ext cx="10178651" cy="5648084"/>
               </a:xfrm>
               <a:blipFill>
                 <a:blip r:embed="rId3"/>
                 <a:stretch>
-                  <a:fillRect/>
+                  <a:fillRect l="-60" r="-838"/>
                 </a:stretch>
               </a:blipFill>
             </p:spPr>
@@ -19102,8 +19019,8 @@
         </p:nvSpPr>
         <p:spPr>
           <a:xfrm>
-            <a:off x="11366899" y="3608464"/>
-            <a:ext cx="10184606" cy="531993"/>
+            <a:off x="11366899" y="3562298"/>
+            <a:ext cx="10184606" cy="624326"/>
           </a:xfrm>
         </p:spPr>
         <p:txBody>
@@ -19111,7 +19028,9 @@
           <a:lstStyle/>
           <a:p>
             <a:r>
-              <a:rPr lang="en-US" dirty="0"/>
+              <a:rPr lang="en-US" sz="3200" dirty="0">
+                <a:latin typeface="+mj-lt"/>
+              </a:rPr>
               <a:t>PROBLEM FORMULATION</a:t>
             </a:r>
           </a:p>
@@ -19129,8 +19048,8 @@
         </p:nvSpPr>
         <p:spPr>
           <a:xfrm>
-            <a:off x="22046806" y="3608464"/>
-            <a:ext cx="10182022" cy="531993"/>
+            <a:off x="22046806" y="3562298"/>
+            <a:ext cx="10182022" cy="624326"/>
           </a:xfrm>
         </p:spPr>
         <p:txBody>
@@ -19138,10 +19057,11 @@
           <a:lstStyle/>
           <a:p>
             <a:r>
-              <a:rPr lang="en-US" dirty="0" smtClean="0"/>
+              <a:rPr lang="en-US" sz="3200" dirty="0">
+                <a:latin typeface="+mj-lt"/>
+              </a:rPr>
               <a:t>SIMULATONS</a:t>
             </a:r>
-            <a:endParaRPr lang="en-US" dirty="0"/>
           </a:p>
         </p:txBody>
       </p:sp>
@@ -19157,8 +19077,8 @@
         </p:nvSpPr>
         <p:spPr>
           <a:xfrm>
-            <a:off x="22046806" y="4100908"/>
-            <a:ext cx="10182022" cy="1271501"/>
+            <a:off x="22152621" y="8218411"/>
+            <a:ext cx="10287692" cy="606704"/>
           </a:xfrm>
         </p:spPr>
         <p:txBody>
@@ -19166,19 +19086,11 @@
           <a:lstStyle/>
           <a:p>
             <a:r>
-              <a:rPr lang="en-US" b="1" u="sng" dirty="0"/>
-              <a:t>Simulations:</a:t>
+              <a:rPr lang="en-US" dirty="0">
+                <a:latin typeface="+mj-lt"/>
+              </a:rPr>
+              <a:t>(a) No Overhead Delay            (b) No adaptation           (c) Conservative navigation  (d) Adaptive navigation</a:t>
             </a:r>
-          </a:p>
-          <a:p>
-            <a:pPr marL="342900" indent="-342900">
-              <a:buFont typeface="Arial" panose="020B0604020202020204" pitchFamily="34" charset="0"/>
-              <a:buChar char="•"/>
-            </a:pPr>
-            <a:endParaRPr lang="en-US" dirty="0"/>
-          </a:p>
-          <a:p>
-            <a:endParaRPr lang="en-US" dirty="0"/>
           </a:p>
         </p:txBody>
       </p:sp>
@@ -19194,19 +19106,17 @@
         </p:nvSpPr>
         <p:spPr>
           <a:xfrm>
-            <a:off x="22019807" y="10293210"/>
-            <a:ext cx="10185796" cy="6534480"/>
+            <a:off x="22019807" y="10119039"/>
+            <a:ext cx="10185796" cy="5943549"/>
           </a:xfrm>
         </p:spPr>
         <p:txBody>
           <a:bodyPr/>
           <a:lstStyle/>
           <a:p>
-            <a:r>
-              <a:rPr lang="en-US" b="1" u="sng" dirty="0"/>
-              <a:t>Experiments:</a:t>
-            </a:r>
-            <a:endParaRPr lang="en-US" dirty="0"/>
+            <a:endParaRPr lang="en-US" sz="2400" dirty="0">
+              <a:latin typeface="+mj-lt"/>
+            </a:endParaRPr>
           </a:p>
           <a:p>
             <a:pPr marL="342900" indent="-342900">
@@ -19214,10 +19124,14 @@
               <a:buAutoNum type="alphaUcPeriod"/>
             </a:pPr>
             <a:r>
-              <a:rPr lang="en-US" b="1" u="sng" dirty="0"/>
-              <a:t>Integrating Software Level Cyber Security Techniques On A Real Autonomous Vehicle:</a:t>
+              <a:rPr lang="en-US" sz="2400" b="1" u="sng" dirty="0">
+                <a:latin typeface="+mj-lt"/>
+              </a:rPr>
+              <a:t>Integrating Software Level Cyber Security Techniques On A Real AV:</a:t>
             </a:r>
-            <a:endParaRPr lang="en-US" u="sng" dirty="0"/>
+            <a:endParaRPr lang="en-US" sz="2400" u="sng" dirty="0">
+              <a:latin typeface="+mj-lt"/>
+            </a:endParaRPr>
           </a:p>
           <a:p>
             <a:pPr marL="285750" indent="-285750">
@@ -19225,11 +19139,15 @@
               <a:buChar char="•"/>
             </a:pPr>
             <a:r>
-              <a:rPr lang="en-US" i="1" dirty="0"/>
+              <a:rPr lang="en-US" sz="2400" i="1" dirty="0">
+                <a:latin typeface="+mj-lt"/>
+              </a:rPr>
               <a:t>Double Helix </a:t>
             </a:r>
             <a:r>
-              <a:rPr lang="en-US" dirty="0"/>
+              <a:rPr lang="en-US" sz="2400" dirty="0">
+                <a:latin typeface="+mj-lt"/>
+              </a:rPr>
               <a:t>is used to protect ROS nodes for mapping and navigation.</a:t>
             </a:r>
           </a:p>
@@ -19238,31 +19156,46 @@
               <a:buFont typeface="Arial" panose="020B0604020202020204" pitchFamily="34" charset="0"/>
               <a:buChar char="•"/>
             </a:pPr>
-            <a:endParaRPr lang="en-US" dirty="0"/>
+            <a:endParaRPr lang="en-US" sz="2400" dirty="0">
+              <a:latin typeface="+mj-lt"/>
+            </a:endParaRPr>
+          </a:p>
+          <a:p>
+            <a:endParaRPr lang="en-US" sz="2400" dirty="0">
+              <a:latin typeface="+mj-lt"/>
+            </a:endParaRPr>
           </a:p>
           <a:p>
             <a:pPr marL="342900" indent="-342900">
               <a:buFont typeface="Arial" panose="020B0604020202020204" pitchFamily="34" charset="0"/>
               <a:buChar char="•"/>
             </a:pPr>
-            <a:endParaRPr lang="en-US" dirty="0"/>
+            <a:endParaRPr lang="en-US" sz="2400" dirty="0">
+              <a:latin typeface="+mj-lt"/>
+            </a:endParaRPr>
           </a:p>
           <a:p>
             <a:pPr marL="342900" indent="-342900">
               <a:buFont typeface="Arial" panose="020B0604020202020204" pitchFamily="34" charset="0"/>
               <a:buChar char="•"/>
             </a:pPr>
-            <a:endParaRPr lang="en-US" dirty="0"/>
+            <a:endParaRPr lang="en-US" sz="2400" dirty="0">
+              <a:latin typeface="+mj-lt"/>
+            </a:endParaRPr>
+          </a:p>
+          <a:p>
+            <a:endParaRPr lang="en-US" sz="2400" dirty="0">
+              <a:latin typeface="+mj-lt"/>
+            </a:endParaRPr>
           </a:p>
           <a:p>
             <a:pPr marL="342900" indent="-342900">
               <a:buFont typeface="Arial" panose="020B0604020202020204" pitchFamily="34" charset="0"/>
               <a:buChar char="•"/>
             </a:pPr>
-            <a:endParaRPr lang="en-US" dirty="0"/>
-          </a:p>
-          <a:p>
-            <a:endParaRPr lang="en-US" dirty="0"/>
+            <a:endParaRPr lang="en-US" sz="2400" dirty="0">
+              <a:latin typeface="+mj-lt"/>
+            </a:endParaRPr>
           </a:p>
           <a:p>
             <a:pPr marL="342900" indent="-342900">
@@ -19270,51 +19203,11 @@
               <a:buChar char="•"/>
             </a:pPr>
             <a:r>
-              <a:rPr lang="en-US" dirty="0"/>
-              <a:t>We recorded the performance overhead imposed by the protected controllers  measuring delays up to 30%.</a:t>
+              <a:rPr lang="en-US" sz="2400" dirty="0">
+                <a:latin typeface="+mj-lt"/>
+              </a:rPr>
+              <a:t>Performance overhead imposed by the protected controllers reached up to 30%.</a:t>
             </a:r>
-          </a:p>
-          <a:p>
-            <a:pPr marL="342900" indent="-342900">
-              <a:buFont typeface="Arial" panose="020B0604020202020204" pitchFamily="34" charset="0"/>
-              <a:buChar char="•"/>
-            </a:pPr>
-            <a:endParaRPr lang="en-US" dirty="0"/>
-          </a:p>
-          <a:p>
-            <a:pPr marL="342900" indent="-342900">
-              <a:buFont typeface="Arial" panose="020B0604020202020204" pitchFamily="34" charset="0"/>
-              <a:buChar char="•"/>
-            </a:pPr>
-            <a:endParaRPr lang="en-US" dirty="0"/>
-          </a:p>
-          <a:p>
-            <a:pPr marL="342900" indent="-342900">
-              <a:buFont typeface="Arial" panose="020B0604020202020204" pitchFamily="34" charset="0"/>
-              <a:buChar char="•"/>
-            </a:pPr>
-            <a:endParaRPr lang="en-US" dirty="0"/>
-          </a:p>
-          <a:p>
-            <a:pPr marL="342900" indent="-342900">
-              <a:buFont typeface="Arial" panose="020B0604020202020204" pitchFamily="34" charset="0"/>
-              <a:buChar char="•"/>
-            </a:pPr>
-            <a:endParaRPr lang="en-US" dirty="0"/>
-          </a:p>
-          <a:p>
-            <a:endParaRPr lang="en-US" dirty="0"/>
-          </a:p>
-          <a:p>
-            <a:pPr algn="ctr"/>
-            <a:endParaRPr lang="ar-EG" b="1" u="sng" dirty="0"/>
-          </a:p>
-          <a:p>
-            <a:pPr marL="342900" indent="-342900">
-              <a:buFont typeface="Arial" panose="020B0604020202020204" pitchFamily="34" charset="0"/>
-              <a:buChar char="•"/>
-            </a:pPr>
-            <a:endParaRPr lang="en-US" dirty="0"/>
           </a:p>
           <a:p>
             <a:pPr marL="342900" indent="-342900">
@@ -19322,12 +19215,16 @@
               <a:buAutoNum type="alphaUcPeriod" startAt="2"/>
             </a:pPr>
             <a:r>
-              <a:rPr lang="en-US" b="1" u="sng" dirty="0"/>
+              <a:rPr lang="en-US" sz="2400" b="1" u="sng" dirty="0">
+                <a:latin typeface="+mj-lt"/>
+              </a:rPr>
               <a:t>Online Adaptation Control with Unknown Overhead:</a:t>
             </a:r>
           </a:p>
           <a:p>
-            <a:endParaRPr lang="en-US" dirty="0"/>
+            <a:endParaRPr lang="en-US" sz="2400" dirty="0">
+              <a:latin typeface="+mj-lt"/>
+            </a:endParaRPr>
           </a:p>
         </p:txBody>
       </p:sp>
@@ -19343,8 +19240,8 @@
         </p:nvSpPr>
         <p:spPr>
           <a:xfrm>
-            <a:off x="22023581" y="18686719"/>
-            <a:ext cx="10182022" cy="531993"/>
+            <a:off x="22023581" y="17914840"/>
+            <a:ext cx="10182022" cy="624326"/>
           </a:xfrm>
         </p:spPr>
         <p:txBody>
@@ -19352,7 +19249,9 @@
           <a:lstStyle/>
           <a:p>
             <a:r>
-              <a:rPr lang="en-US" dirty="0"/>
+              <a:rPr lang="en-US" sz="3200" dirty="0">
+                <a:latin typeface="+mj-lt"/>
+              </a:rPr>
               <a:t>CONCLUSION AND FUTURE WORK</a:t>
             </a:r>
           </a:p>
@@ -19370,8 +19269,8 @@
         </p:nvSpPr>
         <p:spPr>
           <a:xfrm>
-            <a:off x="22046807" y="19197671"/>
-            <a:ext cx="10185796" cy="1271501"/>
+            <a:off x="22046807" y="18297786"/>
+            <a:ext cx="10185796" cy="2324097"/>
           </a:xfrm>
         </p:spPr>
         <p:txBody>
@@ -19383,8 +19282,10 @@
               <a:buChar char="•"/>
             </a:pPr>
             <a:r>
-              <a:rPr lang="en-US" dirty="0"/>
-              <a:t>We can achieve a good performance in terms of time while maintaining safety and security constraints.</a:t>
+              <a:rPr lang="en-US" sz="2400" dirty="0">
+                <a:latin typeface="+mj-lt"/>
+              </a:rPr>
+              <a:t>Trade-off between achieving  high performance and maintaining safety and security constraints.</a:t>
             </a:r>
           </a:p>
           <a:p>
@@ -19393,8 +19294,10 @@
               <a:buChar char="•"/>
             </a:pPr>
             <a:r>
-              <a:rPr lang="en-US" dirty="0"/>
-              <a:t>Extension to aerial vehicles.</a:t>
+              <a:rPr lang="en-US" sz="2400" dirty="0">
+                <a:latin typeface="+mj-lt"/>
+              </a:rPr>
+              <a:t>Extension to unmanned aerial vehicles (UAVs).</a:t>
             </a:r>
           </a:p>
           <a:p>
@@ -19403,8 +19306,10 @@
               <a:buChar char="•"/>
             </a:pPr>
             <a:r>
-              <a:rPr lang="en-US" dirty="0"/>
-              <a:t>Use ML techniques to estimate the delays and adapt the controller input accordingly.</a:t>
+              <a:rPr lang="en-US" sz="2400" dirty="0">
+                <a:latin typeface="+mj-lt"/>
+              </a:rPr>
+              <a:t>Use Machine Learning techniques to estimate the delays and adapt the controller input accordingly.</a:t>
             </a:r>
           </a:p>
         </p:txBody>
@@ -19432,65 +19337,97 @@
           <a:lstStyle/>
           <a:p>
             <a:r>
-              <a:rPr lang="en-US" dirty="0"/>
+              <a:rPr lang="en-US" dirty="0">
+                <a:latin typeface="+mj-lt"/>
+              </a:rPr>
               <a:t>Mahmoud Elnaggar</a:t>
             </a:r>
             <a:r>
-              <a:rPr lang="en-US" baseline="30000" dirty="0"/>
+              <a:rPr lang="en-US" baseline="30000" dirty="0">
+                <a:latin typeface="+mj-lt"/>
+              </a:rPr>
               <a:t>1</a:t>
             </a:r>
             <a:r>
-              <a:rPr lang="en-US" dirty="0"/>
+              <a:rPr lang="en-US" dirty="0">
+                <a:latin typeface="+mj-lt"/>
+              </a:rPr>
               <a:t>, Jason D. Hiser</a:t>
             </a:r>
             <a:r>
-              <a:rPr lang="en-US" baseline="30000" dirty="0"/>
+              <a:rPr lang="en-US" baseline="30000" dirty="0">
+                <a:latin typeface="+mj-lt"/>
+              </a:rPr>
               <a:t>2</a:t>
             </a:r>
             <a:r>
-              <a:rPr lang="en-US" dirty="0"/>
+              <a:rPr lang="en-US" dirty="0">
+                <a:latin typeface="+mj-lt"/>
+              </a:rPr>
               <a:t>, Tony X. Lin</a:t>
             </a:r>
             <a:r>
-              <a:rPr lang="en-US" baseline="30000" dirty="0"/>
+              <a:rPr lang="en-US" baseline="30000" dirty="0">
+                <a:latin typeface="+mj-lt"/>
+              </a:rPr>
               <a:t>3</a:t>
             </a:r>
             <a:r>
-              <a:rPr lang="en-US" dirty="0"/>
+              <a:rPr lang="en-US" dirty="0">
+                <a:latin typeface="+mj-lt"/>
+              </a:rPr>
               <a:t>, Anh Nguyen-Tuong</a:t>
             </a:r>
             <a:r>
-              <a:rPr lang="en-US" baseline="30000" dirty="0"/>
+              <a:rPr lang="en-US" baseline="30000" dirty="0">
+                <a:latin typeface="+mj-lt"/>
+              </a:rPr>
               <a:t>2</a:t>
             </a:r>
             <a:r>
-              <a:rPr lang="en-US" dirty="0"/>
+              <a:rPr lang="en-US" dirty="0">
+                <a:latin typeface="+mj-lt"/>
+              </a:rPr>
               <a:t>, Michele Co</a:t>
             </a:r>
             <a:r>
-              <a:rPr lang="en-US" baseline="30000" dirty="0"/>
+              <a:rPr lang="en-US" baseline="30000" dirty="0">
+                <a:latin typeface="+mj-lt"/>
+              </a:rPr>
               <a:t>2</a:t>
             </a:r>
             <a:r>
-              <a:rPr lang="en-US" dirty="0"/>
+              <a:rPr lang="en-US" dirty="0">
+                <a:latin typeface="+mj-lt"/>
+              </a:rPr>
               <a:t>, Jack W. Davidson</a:t>
             </a:r>
             <a:r>
-              <a:rPr lang="en-US" baseline="30000" dirty="0"/>
+              <a:rPr lang="en-US" baseline="30000" dirty="0">
+                <a:latin typeface="+mj-lt"/>
+              </a:rPr>
               <a:t>2</a:t>
             </a:r>
             <a:r>
-              <a:rPr lang="en-US" dirty="0"/>
+              <a:rPr lang="en-US" dirty="0">
+                <a:latin typeface="+mj-lt"/>
+              </a:rPr>
               <a:t>, and Nicola Bezzo</a:t>
             </a:r>
             <a:r>
-              <a:rPr lang="en-US" baseline="30000" dirty="0"/>
+              <a:rPr lang="en-US" baseline="30000" dirty="0">
+                <a:latin typeface="+mj-lt"/>
+              </a:rPr>
               <a:t>1,3</a:t>
             </a:r>
-            <a:endParaRPr lang="en-US" dirty="0"/>
+            <a:endParaRPr lang="en-US" dirty="0">
+              <a:latin typeface="+mj-lt"/>
+            </a:endParaRPr>
           </a:p>
           <a:p>
-            <a:endParaRPr lang="en-US" dirty="0"/>
+            <a:endParaRPr lang="en-US" dirty="0">
+              <a:latin typeface="+mj-lt"/>
+            </a:endParaRPr>
           </a:p>
         </p:txBody>
       </p:sp>
@@ -19517,38 +19454,54 @@
           <a:lstStyle/>
           <a:p>
             <a:r>
-              <a:rPr lang="en-US" sz="2800" baseline="30000" dirty="0"/>
+              <a:rPr lang="en-US" sz="2800" baseline="30000" dirty="0">
+                <a:latin typeface="+mj-lt"/>
+              </a:rPr>
               <a:t>1</a:t>
             </a:r>
             <a:r>
-              <a:rPr lang="en-US" sz="2800" dirty="0"/>
+              <a:rPr lang="en-US" sz="2800" dirty="0">
+                <a:latin typeface="+mj-lt"/>
+              </a:rPr>
               <a:t>Department of Systems and Information Engineering, </a:t>
             </a:r>
             <a:r>
-              <a:rPr lang="en-US" sz="2800" baseline="30000" dirty="0"/>
+              <a:rPr lang="en-US" sz="2800" baseline="30000" dirty="0">
+                <a:latin typeface="+mj-lt"/>
+              </a:rPr>
               <a:t>2</a:t>
             </a:r>
             <a:r>
-              <a:rPr lang="en-US" sz="2800" dirty="0"/>
+              <a:rPr lang="en-US" sz="2800" dirty="0">
+                <a:latin typeface="+mj-lt"/>
+              </a:rPr>
               <a:t>Department of Computer Science, </a:t>
             </a:r>
             <a:r>
-              <a:rPr lang="en-US" sz="2800" baseline="30000" dirty="0"/>
+              <a:rPr lang="en-US" sz="2800" baseline="30000" dirty="0">
+                <a:latin typeface="+mj-lt"/>
+              </a:rPr>
               <a:t>3</a:t>
             </a:r>
             <a:r>
-              <a:rPr lang="en-US" sz="2800" dirty="0"/>
+              <a:rPr lang="en-US" sz="2800" dirty="0">
+                <a:latin typeface="+mj-lt"/>
+              </a:rPr>
               <a:t>Department of Electrical and Computer Engineering</a:t>
             </a:r>
           </a:p>
           <a:p>
             <a:r>
-              <a:rPr lang="en-US" sz="2800" dirty="0"/>
+              <a:rPr lang="en-US" sz="2800" dirty="0">
+                <a:latin typeface="+mj-lt"/>
+              </a:rPr>
               <a:t>University of Virginia</a:t>
             </a:r>
           </a:p>
           <a:p>
-            <a:endParaRPr lang="en-US" sz="2800" dirty="0"/>
+            <a:endParaRPr lang="en-US" sz="2800" dirty="0">
+              <a:latin typeface="+mj-lt"/>
+            </a:endParaRPr>
           </a:p>
         </p:txBody>
       </p:sp>
@@ -19575,7 +19528,9 @@
           <a:lstStyle/>
           <a:p>
             <a:r>
-              <a:rPr lang="en-US" sz="6000" dirty="0"/>
+              <a:rPr lang="en-US" sz="6000" dirty="0">
+                <a:latin typeface="+mj-lt"/>
+              </a:rPr>
               <a:t>Online Control Adaptation for Safe and Secure Autonomous Vehicle Operations</a:t>
             </a:r>
           </a:p>
@@ -19586,7 +19541,7 @@
           <p:cNvPr id="20" name="Picture 19">
             <a:extLst>
               <a:ext uri="{FF2B5EF4-FFF2-40B4-BE49-F238E27FC236}">
-                <a16:creationId xmlns:a16="http://schemas.microsoft.com/office/drawing/2014/main" xmlns="" id="{717F65D8-0077-40BE-AAC2-47E0655833B3}"/>
+                <a16:creationId xmlns:a16="http://schemas.microsoft.com/office/drawing/2014/main" id="{717F65D8-0077-40BE-AAC2-47E0655833B3}"/>
               </a:ext>
             </a:extLst>
           </p:cNvPr>
@@ -19622,7 +19577,7 @@
           <p:cNvPr id="22" name="Picture 21">
             <a:extLst>
               <a:ext uri="{FF2B5EF4-FFF2-40B4-BE49-F238E27FC236}">
-                <a16:creationId xmlns:a16="http://schemas.microsoft.com/office/drawing/2014/main" xmlns="" id="{AAD6EF39-D1FE-4CCE-A1D7-FBA7113678CA}"/>
+                <a16:creationId xmlns:a16="http://schemas.microsoft.com/office/drawing/2014/main" id="{AAD6EF39-D1FE-4CCE-A1D7-FBA7113678CA}"/>
               </a:ext>
             </a:extLst>
           </p:cNvPr>
@@ -19658,7 +19613,7 @@
           <p:cNvPr id="24" name="Picture 23">
             <a:extLst>
               <a:ext uri="{FF2B5EF4-FFF2-40B4-BE49-F238E27FC236}">
-                <a16:creationId xmlns:a16="http://schemas.microsoft.com/office/drawing/2014/main" xmlns="" id="{56311A83-4A4C-4FCE-A7A8-767635E54DB2}"/>
+                <a16:creationId xmlns:a16="http://schemas.microsoft.com/office/drawing/2014/main" id="{56311A83-4A4C-4FCE-A7A8-767635E54DB2}"/>
               </a:ext>
             </a:extLst>
           </p:cNvPr>
@@ -19694,7 +19649,7 @@
           <p:cNvPr id="25" name="Picture 24">
             <a:extLst>
               <a:ext uri="{FF2B5EF4-FFF2-40B4-BE49-F238E27FC236}">
-                <a16:creationId xmlns:a16="http://schemas.microsoft.com/office/drawing/2014/main" xmlns="" id="{9BD09127-F037-4488-84FA-F885E8476804}"/>
+                <a16:creationId xmlns:a16="http://schemas.microsoft.com/office/drawing/2014/main" id="{9BD09127-F037-4488-84FA-F885E8476804}"/>
               </a:ext>
             </a:extLst>
           </p:cNvPr>
@@ -19730,7 +19685,7 @@
           <p:cNvPr id="26" name="Picture 25">
             <a:extLst>
               <a:ext uri="{FF2B5EF4-FFF2-40B4-BE49-F238E27FC236}">
-                <a16:creationId xmlns:a16="http://schemas.microsoft.com/office/drawing/2014/main" xmlns="" id="{4949B0D5-6C99-4F60-9E2E-E22DDF45FDB1}"/>
+                <a16:creationId xmlns:a16="http://schemas.microsoft.com/office/drawing/2014/main" id="{4949B0D5-6C99-4F60-9E2E-E22DDF45FDB1}"/>
               </a:ext>
             </a:extLst>
           </p:cNvPr>
@@ -19747,8 +19702,8 @@
         </p:blipFill>
         <p:spPr>
           <a:xfrm>
-            <a:off x="882656" y="10486790"/>
-            <a:ext cx="4476454" cy="3229214"/>
+            <a:off x="1852308" y="9552470"/>
+            <a:ext cx="3323982" cy="2397847"/>
           </a:xfrm>
           <a:prstGeom prst="rect">
             <a:avLst/>
@@ -19760,7 +19715,7 @@
           <p:cNvPr id="27" name="Picture 26">
             <a:extLst>
               <a:ext uri="{FF2B5EF4-FFF2-40B4-BE49-F238E27FC236}">
-                <a16:creationId xmlns:a16="http://schemas.microsoft.com/office/drawing/2014/main" xmlns="" id="{C6426C3A-E0E4-456D-A82E-E1BD58476FE6}"/>
+                <a16:creationId xmlns:a16="http://schemas.microsoft.com/office/drawing/2014/main" id="{C6426C3A-E0E4-456D-A82E-E1BD58476FE6}"/>
               </a:ext>
             </a:extLst>
           </p:cNvPr>
@@ -19777,8 +19732,8 @@
         </p:blipFill>
         <p:spPr>
           <a:xfrm>
-            <a:off x="5583460" y="10436555"/>
-            <a:ext cx="4562866" cy="3249716"/>
+            <a:off x="5737414" y="9435729"/>
+            <a:ext cx="3458346" cy="2463067"/>
           </a:xfrm>
           <a:prstGeom prst="rect">
             <a:avLst/>
@@ -19790,7 +19745,7 @@
           <p:cNvPr id="28" name="Picture 27">
             <a:extLst>
               <a:ext uri="{FF2B5EF4-FFF2-40B4-BE49-F238E27FC236}">
-                <a16:creationId xmlns:a16="http://schemas.microsoft.com/office/drawing/2014/main" xmlns="" id="{55B6A41F-70CB-49AB-B3C9-E3C7CD0E0C23}"/>
+                <a16:creationId xmlns:a16="http://schemas.microsoft.com/office/drawing/2014/main" id="{55B6A41F-70CB-49AB-B3C9-E3C7CD0E0C23}"/>
               </a:ext>
             </a:extLst>
           </p:cNvPr>
@@ -19807,8 +19762,8 @@
         </p:blipFill>
         <p:spPr>
           <a:xfrm>
-            <a:off x="3429000" y="17007369"/>
-            <a:ext cx="4691738" cy="3354374"/>
+            <a:off x="3781463" y="17283125"/>
+            <a:ext cx="4037746" cy="2886800"/>
           </a:xfrm>
           <a:prstGeom prst="rect">
             <a:avLst/>
@@ -19820,7 +19775,7 @@
           <p:cNvPr id="29" name="Picture 28">
             <a:extLst>
               <a:ext uri="{FF2B5EF4-FFF2-40B4-BE49-F238E27FC236}">
-                <a16:creationId xmlns:a16="http://schemas.microsoft.com/office/drawing/2014/main" xmlns="" id="{80CF3611-3902-4D33-8F66-997F404F1E60}"/>
+                <a16:creationId xmlns:a16="http://schemas.microsoft.com/office/drawing/2014/main" id="{80CF3611-3902-4D33-8F66-997F404F1E60}"/>
               </a:ext>
             </a:extLst>
           </p:cNvPr>
@@ -19837,7 +19792,7 @@
         </p:blipFill>
         <p:spPr>
           <a:xfrm>
-            <a:off x="13919419" y="6739913"/>
+            <a:off x="11787244" y="6788010"/>
             <a:ext cx="5156003" cy="903151"/>
           </a:xfrm>
           <a:prstGeom prst="rect">
@@ -19850,7 +19805,7 @@
           <p:cNvPr id="30" name="Picture 29">
             <a:extLst>
               <a:ext uri="{FF2B5EF4-FFF2-40B4-BE49-F238E27FC236}">
-                <a16:creationId xmlns:a16="http://schemas.microsoft.com/office/drawing/2014/main" xmlns="" id="{EC55E314-61B4-487D-8557-51802CFBE447}"/>
+                <a16:creationId xmlns:a16="http://schemas.microsoft.com/office/drawing/2014/main" id="{EC55E314-61B4-487D-8557-51802CFBE447}"/>
               </a:ext>
             </a:extLst>
           </p:cNvPr>
@@ -19867,7 +19822,7 @@
         </p:blipFill>
         <p:spPr>
           <a:xfrm>
-            <a:off x="14687561" y="7841876"/>
+            <a:off x="17424650" y="6585465"/>
             <a:ext cx="3619718" cy="1202054"/>
           </a:xfrm>
           <a:prstGeom prst="rect">
@@ -19880,7 +19835,7 @@
           <p:cNvPr id="31" name="Picture 30">
             <a:extLst>
               <a:ext uri="{FF2B5EF4-FFF2-40B4-BE49-F238E27FC236}">
-                <a16:creationId xmlns:a16="http://schemas.microsoft.com/office/drawing/2014/main" xmlns="" id="{14C8858F-39EE-4575-B3DE-50227249F59F}"/>
+                <a16:creationId xmlns:a16="http://schemas.microsoft.com/office/drawing/2014/main" id="{14C8858F-39EE-4575-B3DE-50227249F59F}"/>
               </a:ext>
             </a:extLst>
           </p:cNvPr>
@@ -19897,22 +19852,22 @@
         </p:blipFill>
         <p:spPr>
           <a:xfrm>
-            <a:off x="12986423" y="10495015"/>
-            <a:ext cx="7021993" cy="1359298"/>
+            <a:off x="12840433" y="10374924"/>
+            <a:ext cx="7167984" cy="1387560"/>
           </a:xfrm>
           <a:prstGeom prst="rect">
             <a:avLst/>
           </a:prstGeom>
         </p:spPr>
       </p:pic>
-      <mc:AlternateContent xmlns:mc="http://schemas.openxmlformats.org/markup-compatibility/2006" xmlns:a14="http://schemas.microsoft.com/office/drawing/2010/main">
-        <mc:Choice Requires="a14">
+      <mc:AlternateContent xmlns:mc="http://schemas.openxmlformats.org/markup-compatibility/2006">
+        <mc:Choice xmlns:a14="http://schemas.microsoft.com/office/drawing/2010/main" Requires="a14">
           <p:sp>
             <p:nvSpPr>
               <p:cNvPr id="32" name="Rectangle 31">
                 <a:extLst>
                   <a:ext uri="{FF2B5EF4-FFF2-40B4-BE49-F238E27FC236}">
-                    <a16:creationId xmlns:a16="http://schemas.microsoft.com/office/drawing/2014/main" xmlns="" id="{087602F8-20BF-4F5D-B0A6-6529536E7F98}"/>
+                    <a16:creationId xmlns:a16="http://schemas.microsoft.com/office/drawing/2014/main" id="{087602F8-20BF-4F5D-B0A6-6529536E7F98}"/>
                   </a:ext>
                 </a:extLst>
               </p:cNvPr>
@@ -19921,8 +19876,8 @@
             </p:nvSpPr>
             <p:spPr>
               <a:xfrm>
-                <a:off x="11421685" y="12167799"/>
-                <a:ext cx="10007880" cy="2369880"/>
+                <a:off x="11421685" y="11761399"/>
+                <a:ext cx="10007880" cy="2308324"/>
               </a:xfrm>
               <a:prstGeom prst="rect">
                 <a:avLst/>
@@ -19939,11 +19894,11 @@
                   <a:buChar char="•"/>
                 </a:pPr>
                 <a:r>
-                  <a:rPr lang="en-US" sz="1800" dirty="0">
-                    <a:latin typeface="Times New Roman" panose="02020603050405020304" pitchFamily="18" charset="0"/>
+                  <a:rPr lang="en-US" sz="2400" dirty="0">
+                    <a:latin typeface="+mj-lt"/>
                     <a:cs typeface="Times New Roman" panose="02020603050405020304" pitchFamily="18" charset="0"/>
                   </a:rPr>
-                  <a:t>The delay at each time step is time varying and not known a priori before implementing the control law.</a:t>
+                  <a:t>The delay is time varying and not known a priori.</a:t>
                 </a:r>
               </a:p>
               <a:p>
@@ -19952,30 +19907,16 @@
                   <a:buChar char="•"/>
                 </a:pPr>
                 <a:r>
-                  <a:rPr lang="en-US" sz="1800" dirty="0">
-                    <a:latin typeface="Times New Roman" panose="02020603050405020304" pitchFamily="18" charset="0"/>
+                  <a:rPr lang="en-US" sz="2400" dirty="0">
+                    <a:latin typeface="+mj-lt"/>
                     <a:cs typeface="Times New Roman" panose="02020603050405020304" pitchFamily="18" charset="0"/>
                   </a:rPr>
-                  <a:t>Estimate the delay at each time step using exponential weighted moving average algorithm (EWMA)</a:t>
+                  <a:t>Estimation of the delay using exponential weighted moving average algorithm (EWMA).</a:t>
                 </a:r>
               </a:p>
               <a:p>
-                <a:pPr marL="342900" indent="-342900">
-                  <a:buFont typeface="Arial" pitchFamily="34" charset="0"/>
-                  <a:buChar char="•"/>
-                </a:pPr>
-                <a:endParaRPr lang="en-US" sz="1800" dirty="0">
-                  <a:latin typeface="Times New Roman" panose="02020603050405020304" pitchFamily="18" charset="0"/>
-                  <a:cs typeface="Times New Roman" panose="02020603050405020304" pitchFamily="18" charset="0"/>
-                </a:endParaRPr>
-              </a:p>
-              <a:p>
-                <a:pPr marL="342900" indent="-342900">
-                  <a:buFont typeface="Arial" pitchFamily="34" charset="0"/>
-                  <a:buChar char="•"/>
-                </a:pPr>
-                <a:endParaRPr lang="en-US" sz="1800" dirty="0">
-                  <a:latin typeface="Times New Roman" panose="02020603050405020304" pitchFamily="18" charset="0"/>
+                <a:endParaRPr lang="en-US" sz="2400" dirty="0">
+                  <a:latin typeface="+mj-lt"/>
                   <a:cs typeface="Times New Roman" panose="02020603050405020304" pitchFamily="18" charset="0"/>
                 </a:endParaRPr>
               </a:p>
@@ -19985,28 +19926,26 @@
                   <a:buChar char="•"/>
                 </a:pPr>
                 <a:r>
-                  <a:rPr lang="en-US" sz="1800" dirty="0"/>
-                  <a:t>We inflate the unsafe regions to construct a set of inflated unsafe regions </a:t>
+                  <a:rPr lang="en-US" sz="2400" dirty="0">
+                    <a:latin typeface="+mj-lt"/>
+                  </a:rPr>
+                  <a:t>Unsafe regions are inflated to construct the set </a:t>
                 </a:r>
                 <a14:m>
                   <m:oMath xmlns:m="http://schemas.openxmlformats.org/officeDocument/2006/math">
                     <m:r>
-                      <a:rPr lang="en-US" sz="1800" i="1">
-                        <a:latin typeface="Cambria Math" panose="02040503050406030204" pitchFamily="18" charset="0"/>
+                      <a:rPr lang="en-US" sz="2400" i="1">
+                        <a:latin typeface="+mj-lt"/>
                       </a:rPr>
                       <m:t>𝑆</m:t>
-                    </m:r>
-                    <m:r>
-                      <a:rPr lang="en-US" sz="1800" i="1">
-                        <a:latin typeface="Cambria Math" panose="02040503050406030204" pitchFamily="18" charset="0"/>
-                      </a:rPr>
-                      <m:t> </m:t>
                     </m:r>
                   </m:oMath>
                 </a14:m>
                 <a:r>
-                  <a:rPr lang="en-US" sz="1800" dirty="0"/>
-                  <a:t>that satisfies the following condition:</a:t>
+                  <a:rPr lang="en-US" sz="2400" dirty="0">
+                    <a:latin typeface="+mj-lt"/>
+                  </a:rPr>
+                  <a:t> that satisfies the following:</a:t>
                 </a:r>
               </a:p>
               <a:p>
@@ -20014,15 +19953,15 @@
                   <a:buFont typeface="Arial" pitchFamily="34" charset="0"/>
                   <a:buChar char="•"/>
                 </a:pPr>
-                <a:endParaRPr lang="en-US" sz="1800" dirty="0">
-                  <a:latin typeface="Times New Roman" panose="02020603050405020304" pitchFamily="18" charset="0"/>
+                <a:endParaRPr lang="en-US" sz="2400" dirty="0">
+                  <a:latin typeface="+mj-lt"/>
                   <a:cs typeface="Times New Roman" panose="02020603050405020304" pitchFamily="18" charset="0"/>
                 </a:endParaRPr>
               </a:p>
             </p:txBody>
           </p:sp>
         </mc:Choice>
-        <mc:Fallback xmlns="">
+        <mc:Fallback>
           <p:sp>
             <p:nvSpPr>
               <p:cNvPr id="32" name="Rectangle 31">
@@ -20039,8 +19978,8 @@
             </p:nvSpPr>
             <p:spPr>
               <a:xfrm>
-                <a:off x="11421685" y="12167799"/>
-                <a:ext cx="10007880" cy="2369880"/>
+                <a:off x="11421685" y="11761399"/>
+                <a:ext cx="10007880" cy="2308324"/>
               </a:xfrm>
               <a:prstGeom prst="rect">
                 <a:avLst/>
@@ -20048,7 +19987,7 @@
               <a:blipFill>
                 <a:blip r:embed="rId14"/>
                 <a:stretch>
-                  <a:fillRect l="-427" t="-1285" r="-792"/>
+                  <a:fillRect l="-853" t="-2111" r="-853"/>
                 </a:stretch>
               </a:blipFill>
             </p:spPr>
@@ -20072,7 +20011,7 @@
           <p:cNvPr id="33" name="Picture 32">
             <a:extLst>
               <a:ext uri="{FF2B5EF4-FFF2-40B4-BE49-F238E27FC236}">
-                <a16:creationId xmlns:a16="http://schemas.microsoft.com/office/drawing/2014/main" xmlns="" id="{27EAE69E-78B4-4535-8D79-1124A7FF96DE}"/>
+                <a16:creationId xmlns:a16="http://schemas.microsoft.com/office/drawing/2014/main" id="{27EAE69E-78B4-4535-8D79-1124A7FF96DE}"/>
               </a:ext>
             </a:extLst>
           </p:cNvPr>
@@ -20089,7 +20028,7 @@
         </p:blipFill>
         <p:spPr>
           <a:xfrm>
-            <a:off x="13999764" y="13128702"/>
+            <a:off x="14437526" y="12681807"/>
             <a:ext cx="4910535" cy="447306"/>
           </a:xfrm>
           <a:prstGeom prst="rect">
@@ -20102,7 +20041,7 @@
           <p:cNvPr id="34" name="Picture 33">
             <a:extLst>
               <a:ext uri="{FF2B5EF4-FFF2-40B4-BE49-F238E27FC236}">
-                <a16:creationId xmlns:a16="http://schemas.microsoft.com/office/drawing/2014/main" xmlns="" id="{5353BC2E-7BE3-4C82-94E6-44C810573965}"/>
+                <a16:creationId xmlns:a16="http://schemas.microsoft.com/office/drawing/2014/main" id="{5353BC2E-7BE3-4C82-94E6-44C810573965}"/>
               </a:ext>
             </a:extLst>
           </p:cNvPr>
@@ -20119,7 +20058,7 @@
         </p:blipFill>
         <p:spPr>
           <a:xfrm>
-            <a:off x="13689138" y="14160143"/>
+            <a:off x="11471741" y="13801761"/>
             <a:ext cx="5970892" cy="532474"/>
           </a:xfrm>
           <a:prstGeom prst="rect">
@@ -20132,7 +20071,7 @@
           <p:cNvPr id="35" name="Picture 34">
             <a:extLst>
               <a:ext uri="{FF2B5EF4-FFF2-40B4-BE49-F238E27FC236}">
-                <a16:creationId xmlns:a16="http://schemas.microsoft.com/office/drawing/2014/main" xmlns="" id="{62C90F92-E6E8-4D20-B06F-C4A6FBCC76DA}"/>
+                <a16:creationId xmlns:a16="http://schemas.microsoft.com/office/drawing/2014/main" id="{62C90F92-E6E8-4D20-B06F-C4A6FBCC76DA}"/>
               </a:ext>
             </a:extLst>
           </p:cNvPr>
@@ -20149,7 +20088,7 @@
         </p:blipFill>
         <p:spPr>
           <a:xfrm>
-            <a:off x="13856677" y="14802216"/>
+            <a:off x="13387938" y="14461881"/>
             <a:ext cx="5904690" cy="331892"/>
           </a:xfrm>
           <a:prstGeom prst="rect">
@@ -20162,7 +20101,7 @@
           <p:cNvPr id="36" name="Picture 35">
             <a:extLst>
               <a:ext uri="{FF2B5EF4-FFF2-40B4-BE49-F238E27FC236}">
-                <a16:creationId xmlns:a16="http://schemas.microsoft.com/office/drawing/2014/main" xmlns="" id="{950E99FE-0025-49D1-8D80-47EBAD05235E}"/>
+                <a16:creationId xmlns:a16="http://schemas.microsoft.com/office/drawing/2014/main" id="{950E99FE-0025-49D1-8D80-47EBAD05235E}"/>
               </a:ext>
             </a:extLst>
           </p:cNvPr>
@@ -20179,8 +20118,8 @@
         </p:blipFill>
         <p:spPr>
           <a:xfrm>
-            <a:off x="15681507" y="15307044"/>
-            <a:ext cx="3228792" cy="402275"/>
+            <a:off x="18487599" y="13882255"/>
+            <a:ext cx="3003942" cy="374261"/>
           </a:xfrm>
           <a:prstGeom prst="rect">
             <a:avLst/>
@@ -20192,7 +20131,7 @@
           <p:cNvPr id="37" name="Picture 36">
             <a:extLst>
               <a:ext uri="{FF2B5EF4-FFF2-40B4-BE49-F238E27FC236}">
-                <a16:creationId xmlns:a16="http://schemas.microsoft.com/office/drawing/2014/main" xmlns="" id="{E20F3486-1850-42EB-BBA9-A929944180C0}"/>
+                <a16:creationId xmlns:a16="http://schemas.microsoft.com/office/drawing/2014/main" id="{E20F3486-1850-42EB-BBA9-A929944180C0}"/>
               </a:ext>
             </a:extLst>
           </p:cNvPr>
@@ -20209,7 +20148,7 @@
         </p:blipFill>
         <p:spPr>
           <a:xfrm>
-            <a:off x="14994554" y="15364766"/>
+            <a:off x="17724288" y="13911421"/>
             <a:ext cx="658019" cy="286829"/>
           </a:xfrm>
           <a:prstGeom prst="rect">
@@ -20217,14 +20156,14 @@
           </a:prstGeom>
         </p:spPr>
       </p:pic>
-      <mc:AlternateContent xmlns:mc="http://schemas.openxmlformats.org/markup-compatibility/2006" xmlns:a14="http://schemas.microsoft.com/office/drawing/2010/main">
-        <mc:Choice Requires="a14">
+      <mc:AlternateContent xmlns:mc="http://schemas.openxmlformats.org/markup-compatibility/2006">
+        <mc:Choice xmlns:a14="http://schemas.microsoft.com/office/drawing/2010/main" Requires="a14">
           <p:sp>
             <p:nvSpPr>
               <p:cNvPr id="39" name="Text Placeholder 6">
                 <a:extLst>
                   <a:ext uri="{FF2B5EF4-FFF2-40B4-BE49-F238E27FC236}">
-                    <a16:creationId xmlns:a16="http://schemas.microsoft.com/office/drawing/2014/main" xmlns="" id="{1DAB1BE5-B30D-40D0-B8E9-B2828DE2D8DD}"/>
+                    <a16:creationId xmlns:a16="http://schemas.microsoft.com/office/drawing/2014/main" id="{1DAB1BE5-B30D-40D0-B8E9-B2828DE2D8DD}"/>
                   </a:ext>
                 </a:extLst>
               </p:cNvPr>
@@ -20235,8 +20174,8 @@
             </p:nvSpPr>
             <p:spPr>
               <a:xfrm>
-                <a:off x="11440280" y="15551050"/>
-                <a:ext cx="10048874" cy="3875291"/>
+                <a:off x="11440280" y="14852550"/>
+                <a:ext cx="10048874" cy="4466222"/>
               </a:xfrm>
               <a:prstGeom prst="rect">
                 <a:avLst/>
@@ -20389,11 +20328,15 @@
                   <a:buChar char="•"/>
                 </a:pPr>
                 <a:r>
-                  <a:rPr lang="en-US" b="1" u="sng" dirty="0"/>
+                  <a:rPr lang="en-US" sz="2400" b="1" u="sng" dirty="0">
+                    <a:latin typeface="+mj-lt"/>
+                  </a:rPr>
                   <a:t>Risk-based approach</a:t>
                 </a:r>
                 <a:r>
-                  <a:rPr lang="en-US" dirty="0"/>
+                  <a:rPr lang="en-US" sz="2400" dirty="0">
+                    <a:latin typeface="+mj-lt"/>
+                  </a:rPr>
                   <a:t>: </a:t>
                 </a:r>
               </a:p>
@@ -20403,8 +20346,8 @@
                   <a:buAutoNum type="arabicPeriod"/>
                 </a:pPr>
                 <a:r>
-                  <a:rPr lang="en-US" dirty="0">
-                    <a:latin typeface="Times New Roman" panose="02020603050405020304" pitchFamily="18" charset="0"/>
+                  <a:rPr lang="en-US" sz="2400" dirty="0">
+                    <a:latin typeface="+mj-lt"/>
                     <a:cs typeface="Times New Roman" panose="02020603050405020304" pitchFamily="18" charset="0"/>
                   </a:rPr>
                   <a:t>MPC is used to compute a controller input </a:t>
@@ -20414,23 +20357,23 @@
                     <m:sSub>
                       <m:sSubPr>
                         <m:ctrlPr>
-                          <a:rPr lang="en-US" i="1" smtClean="0">
-                            <a:latin typeface="Cambria Math" charset="0"/>
+                          <a:rPr lang="en-US" sz="2400" i="1" smtClean="0">
+                            <a:latin typeface="+mj-lt"/>
                           </a:rPr>
                         </m:ctrlPr>
                       </m:sSubPr>
                       <m:e>
                         <m:r>
-                          <a:rPr lang="en-US" i="1" smtClean="0">
-                            <a:latin typeface="Cambria Math" panose="02040503050406030204" pitchFamily="18" charset="0"/>
+                          <a:rPr lang="en-US" sz="2400" i="1" smtClean="0">
+                            <a:latin typeface="+mj-lt"/>
                           </a:rPr>
                           <m:t>𝑢</m:t>
                         </m:r>
                       </m:e>
                       <m:sub>
                         <m:r>
-                          <a:rPr lang="en-US" i="1" smtClean="0">
-                            <a:latin typeface="Cambria Math" panose="02040503050406030204" pitchFamily="18" charset="0"/>
+                          <a:rPr lang="en-US" sz="2400" i="1" smtClean="0">
+                            <a:latin typeface="+mj-lt"/>
                           </a:rPr>
                           <m:t>𝑚𝑎𝑥</m:t>
                         </m:r>
@@ -20439,8 +20382,8 @@
                   </m:oMath>
                 </a14:m>
                 <a:r>
-                  <a:rPr lang="en-US" dirty="0">
-                    <a:latin typeface="Times New Roman" panose="02020603050405020304" pitchFamily="18" charset="0"/>
+                  <a:rPr lang="en-US" sz="2400" dirty="0">
+                    <a:latin typeface="+mj-lt"/>
                     <a:cs typeface="Times New Roman" panose="02020603050405020304" pitchFamily="18" charset="0"/>
                   </a:rPr>
                   <a:t> considering maximum delay </a:t>
@@ -20450,23 +20393,23 @@
                     <m:sSub>
                       <m:sSubPr>
                         <m:ctrlPr>
-                          <a:rPr lang="en-US" i="1">
-                            <a:latin typeface="Cambria Math" charset="0"/>
+                          <a:rPr lang="en-US" sz="2400" i="1">
+                            <a:latin typeface="+mj-lt"/>
                           </a:rPr>
                         </m:ctrlPr>
                       </m:sSubPr>
                       <m:e>
                         <m:r>
-                          <a:rPr lang="en-US" i="1">
-                            <a:latin typeface="Cambria Math" panose="02040503050406030204" pitchFamily="18" charset="0"/>
+                          <a:rPr lang="en-US" sz="2400" i="1">
+                            <a:latin typeface="+mj-lt"/>
                           </a:rPr>
                           <m:t>𝛿</m:t>
                         </m:r>
                       </m:e>
                       <m:sub>
                         <m:r>
-                          <a:rPr lang="en-US" i="1">
-                            <a:latin typeface="Cambria Math" panose="02040503050406030204" pitchFamily="18" charset="0"/>
+                          <a:rPr lang="en-US" sz="2400" i="1">
+                            <a:latin typeface="+mj-lt"/>
                           </a:rPr>
                           <m:t>𝑚𝑎𝑥</m:t>
                         </m:r>
@@ -20475,8 +20418,8 @@
                   </m:oMath>
                 </a14:m>
                 <a:r>
-                  <a:rPr lang="en-US" dirty="0">
-                    <a:latin typeface="Times New Roman" panose="02020603050405020304" pitchFamily="18" charset="0"/>
+                  <a:rPr lang="en-US" sz="2400" dirty="0">
+                    <a:latin typeface="+mj-lt"/>
                     <a:cs typeface="Times New Roman" panose="02020603050405020304" pitchFamily="18" charset="0"/>
                   </a:rPr>
                   <a:t>. </a:t>
@@ -20488,8 +20431,8 @@
                   <a:buAutoNum type="arabicPeriod"/>
                 </a:pPr>
                 <a:r>
-                  <a:rPr lang="en-US" dirty="0">
-                    <a:latin typeface="Times New Roman" panose="02020603050405020304" pitchFamily="18" charset="0"/>
+                  <a:rPr lang="en-US" sz="2400" dirty="0">
+                    <a:latin typeface="+mj-lt"/>
                     <a:cs typeface="Times New Roman" panose="02020603050405020304" pitchFamily="18" charset="0"/>
                   </a:rPr>
                   <a:t>A risk factor </a:t>
@@ -20497,22 +20440,22 @@
                 <a14:m>
                   <m:oMath xmlns:m="http://schemas.openxmlformats.org/officeDocument/2006/math">
                     <m:r>
-                      <a:rPr lang="en-US" i="1" smtClean="0">
-                        <a:latin typeface="Cambria Math" panose="02040503050406030204" pitchFamily="18" charset="0"/>
+                      <a:rPr lang="en-US" sz="2400" i="1" smtClean="0">
+                        <a:latin typeface="+mj-lt"/>
                       </a:rPr>
                       <m:t>𝑟</m:t>
                     </m:r>
                     <m:r>
-                      <a:rPr lang="en-US" i="1" smtClean="0">
-                        <a:latin typeface="Cambria Math" panose="02040503050406030204" pitchFamily="18" charset="0"/>
+                      <a:rPr lang="en-US" sz="2400" i="1" smtClean="0">
+                        <a:latin typeface="+mj-lt"/>
                       </a:rPr>
                       <m:t> </m:t>
                     </m:r>
                   </m:oMath>
                 </a14:m>
                 <a:r>
-                  <a:rPr lang="en-US" dirty="0">
-                    <a:latin typeface="Times New Roman" panose="02020603050405020304" pitchFamily="18" charset="0"/>
+                  <a:rPr lang="en-US" sz="2400" dirty="0">
+                    <a:latin typeface="+mj-lt"/>
                     <a:cs typeface="Times New Roman" panose="02020603050405020304" pitchFamily="18" charset="0"/>
                   </a:rPr>
                   <a:t>that indicates the accuracy of the last estimated delay.</a:t>
@@ -20523,28 +20466,8 @@
                   <a:buFont typeface="+mj-lt"/>
                   <a:buAutoNum type="arabicPeriod"/>
                 </a:pPr>
-                <a:endParaRPr lang="en-US" dirty="0">
-                  <a:latin typeface="Times New Roman" panose="02020603050405020304" pitchFamily="18" charset="0"/>
-                  <a:cs typeface="Times New Roman" panose="02020603050405020304" pitchFamily="18" charset="0"/>
-                </a:endParaRPr>
-              </a:p>
-              <a:p>
-                <a:pPr marL="1404076" lvl="1" indent="-342900">
-                  <a:buFont typeface="+mj-lt"/>
-                  <a:buAutoNum type="arabicPeriod"/>
-                </a:pPr>
-                <a:endParaRPr lang="en-US" dirty="0">
-                  <a:latin typeface="Times New Roman" panose="02020603050405020304" pitchFamily="18" charset="0"/>
-                  <a:cs typeface="Times New Roman" panose="02020603050405020304" pitchFamily="18" charset="0"/>
-                </a:endParaRPr>
-              </a:p>
-              <a:p>
-                <a:pPr marL="1404076" lvl="1" indent="-342900">
-                  <a:buFont typeface="+mj-lt"/>
-                  <a:buAutoNum type="arabicPeriod"/>
-                </a:pPr>
-                <a:endParaRPr lang="en-US" dirty="0">
-                  <a:latin typeface="Times New Roman" panose="02020603050405020304" pitchFamily="18" charset="0"/>
+                <a:endParaRPr lang="en-US" sz="2400" dirty="0">
+                  <a:latin typeface="+mj-lt"/>
                   <a:cs typeface="Times New Roman" panose="02020603050405020304" pitchFamily="18" charset="0"/>
                 </a:endParaRPr>
               </a:p>
@@ -20554,8 +20477,8 @@
                   <a:buAutoNum type="arabicPeriod"/>
                 </a:pPr>
                 <a:r>
-                  <a:rPr lang="en-US" dirty="0">
-                    <a:latin typeface="Times New Roman" panose="02020603050405020304" pitchFamily="18" charset="0"/>
+                  <a:rPr lang="en-US" sz="2400" dirty="0">
+                    <a:latin typeface="+mj-lt"/>
                     <a:cs typeface="Times New Roman" panose="02020603050405020304" pitchFamily="18" charset="0"/>
                   </a:rPr>
                   <a:t>Finally, the adapted controller input</a:t>
@@ -20563,8 +20486,8 @@
                 <a14:m>
                   <m:oMath xmlns:m="http://schemas.openxmlformats.org/officeDocument/2006/math">
                     <m:r>
-                      <a:rPr lang="en-US" smtClean="0">
-                        <a:latin typeface="Cambria Math" panose="02040503050406030204" pitchFamily="18" charset="0"/>
+                      <a:rPr lang="en-US" sz="2400" smtClean="0">
+                        <a:latin typeface="+mj-lt"/>
                       </a:rPr>
                       <m:t> </m:t>
                     </m:r>
@@ -20572,50 +20495,56 @@
                       <m:rPr>
                         <m:sty m:val="p"/>
                       </m:rPr>
-                      <a:rPr lang="en-US">
-                        <a:latin typeface="Cambria Math" panose="02040503050406030204" pitchFamily="18" charset="0"/>
+                      <a:rPr lang="en-US" sz="2400">
+                        <a:latin typeface="+mj-lt"/>
                       </a:rPr>
                       <m:t>u</m:t>
                     </m:r>
                     <m:r>
-                      <a:rPr lang="en-US" i="1">
-                        <a:latin typeface="Cambria Math" panose="02040503050406030204" pitchFamily="18" charset="0"/>
+                      <a:rPr lang="en-US" sz="2400" i="1">
+                        <a:latin typeface="+mj-lt"/>
                       </a:rPr>
                       <m:t>̂</m:t>
                     </m:r>
                     <m:r>
-                      <a:rPr lang="en-US" i="1" smtClean="0">
-                        <a:latin typeface="Cambria Math" panose="02040503050406030204" pitchFamily="18" charset="0"/>
+                      <a:rPr lang="en-US" sz="2400" i="1" smtClean="0">
+                        <a:latin typeface="+mj-lt"/>
                       </a:rPr>
                       <m:t>(</m:t>
                     </m:r>
                     <m:r>
-                      <a:rPr lang="en-US" i="1" smtClean="0">
-                        <a:latin typeface="Cambria Math" panose="02040503050406030204" pitchFamily="18" charset="0"/>
+                      <a:rPr lang="en-US" sz="2400" i="1" smtClean="0">
+                        <a:latin typeface="+mj-lt"/>
                       </a:rPr>
                       <m:t>𝑘</m:t>
                     </m:r>
                     <m:r>
-                      <a:rPr lang="en-US" i="1" smtClean="0">
-                        <a:latin typeface="Cambria Math" panose="02040503050406030204" pitchFamily="18" charset="0"/>
+                      <a:rPr lang="en-US" sz="2400" i="1" smtClean="0">
+                        <a:latin typeface="+mj-lt"/>
                       </a:rPr>
                       <m:t>)</m:t>
                     </m:r>
                   </m:oMath>
                 </a14:m>
                 <a:r>
-                  <a:rPr lang="en-US" dirty="0">
-                    <a:latin typeface="Times New Roman" panose="02020603050405020304" pitchFamily="18" charset="0"/>
+                  <a:rPr lang="en-US" sz="2400" dirty="0">
+                    <a:latin typeface="+mj-lt"/>
                     <a:cs typeface="Times New Roman" panose="02020603050405020304" pitchFamily="18" charset="0"/>
                   </a:rPr>
                   <a:t> is applied to the AV.</a:t>
                 </a:r>
+                <a:endParaRPr lang="en-US" sz="2400" dirty="0">
+                  <a:latin typeface="+mj-lt"/>
+                </a:endParaRPr>
               </a:p>
               <a:p>
-                <a:endParaRPr lang="en-US" dirty="0"/>
-              </a:p>
-              <a:p>
-                <a:endParaRPr lang="en-US" dirty="0"/>
+                <a:pPr marL="342900" indent="-342900">
+                  <a:buFont typeface="Arial" pitchFamily="34" charset="0"/>
+                  <a:buChar char="•"/>
+                </a:pPr>
+                <a:endParaRPr lang="en-US" sz="2400" dirty="0">
+                  <a:latin typeface="+mj-lt"/>
+                </a:endParaRPr>
               </a:p>
               <a:p>
                 <a:pPr marL="342900" indent="-342900">
@@ -20623,15 +20552,19 @@
                   <a:buChar char="•"/>
                 </a:pPr>
                 <a:r>
-                  <a:rPr lang="en-US" dirty="0"/>
+                  <a:rPr lang="en-US" sz="2400" dirty="0">
+                    <a:latin typeface="+mj-lt"/>
+                  </a:rPr>
                   <a:t>If the state of the AV lies inside the inflated region, the algorithm generates the conservative control input</a:t>
                 </a:r>
-                <a:endParaRPr lang="ar-EG" dirty="0"/>
+                <a:endParaRPr lang="ar-EG" sz="2400" dirty="0">
+                  <a:latin typeface="+mj-lt"/>
+                </a:endParaRPr>
               </a:p>
             </p:txBody>
           </p:sp>
         </mc:Choice>
-        <mc:Fallback xmlns="">
+        <mc:Fallback>
           <p:sp>
             <p:nvSpPr>
               <p:cNvPr id="39" name="Text Placeholder 6">
@@ -20648,8 +20581,8 @@
             </p:nvSpPr>
             <p:spPr>
               <a:xfrm>
-                <a:off x="11440280" y="15551050"/>
-                <a:ext cx="10048874" cy="3875291"/>
+                <a:off x="11440280" y="14852550"/>
+                <a:ext cx="10048874" cy="4466222"/>
               </a:xfrm>
               <a:prstGeom prst="rect">
                 <a:avLst/>
@@ -20657,7 +20590,7 @@
               <a:blipFill>
                 <a:blip r:embed="rId20"/>
                 <a:stretch>
-                  <a:fillRect/>
+                  <a:fillRect l="-121" r="-485"/>
                 </a:stretch>
               </a:blipFill>
             </p:spPr>
@@ -20681,7 +20614,7 @@
           <p:cNvPr id="40" name="Picture 39">
             <a:extLst>
               <a:ext uri="{FF2B5EF4-FFF2-40B4-BE49-F238E27FC236}">
-                <a16:creationId xmlns:a16="http://schemas.microsoft.com/office/drawing/2014/main" xmlns="" id="{5AE199B2-12A3-4DE2-B7E2-883DC5EC3A5C}"/>
+                <a16:creationId xmlns:a16="http://schemas.microsoft.com/office/drawing/2014/main" id="{5AE199B2-12A3-4DE2-B7E2-883DC5EC3A5C}"/>
               </a:ext>
             </a:extLst>
           </p:cNvPr>
@@ -20698,7 +20631,7 @@
         </p:blipFill>
         <p:spPr>
           <a:xfrm>
-            <a:off x="14594370" y="16713795"/>
+            <a:off x="14413907" y="16587509"/>
             <a:ext cx="3662509" cy="910979"/>
           </a:xfrm>
           <a:prstGeom prst="rect">
@@ -20711,7 +20644,7 @@
           <p:cNvPr id="41" name="Picture 40">
             <a:extLst>
               <a:ext uri="{FF2B5EF4-FFF2-40B4-BE49-F238E27FC236}">
-                <a16:creationId xmlns:a16="http://schemas.microsoft.com/office/drawing/2014/main" xmlns="" id="{4500563E-5C38-4272-8C61-D5AA5313544E}"/>
+                <a16:creationId xmlns:a16="http://schemas.microsoft.com/office/drawing/2014/main" id="{4500563E-5C38-4272-8C61-D5AA5313544E}"/>
               </a:ext>
             </a:extLst>
           </p:cNvPr>
@@ -20728,7 +20661,7 @@
         </p:blipFill>
         <p:spPr>
           <a:xfrm>
-            <a:off x="13534896" y="18115835"/>
+            <a:off x="13265627" y="17885763"/>
             <a:ext cx="2764955" cy="514554"/>
           </a:xfrm>
           <a:prstGeom prst="rect">
@@ -20741,7 +20674,7 @@
           <p:cNvPr id="42" name="Picture 41">
             <a:extLst>
               <a:ext uri="{FF2B5EF4-FFF2-40B4-BE49-F238E27FC236}">
-                <a16:creationId xmlns:a16="http://schemas.microsoft.com/office/drawing/2014/main" xmlns="" id="{59ADD550-8769-4DB8-A1E9-7F6DD91498F8}"/>
+                <a16:creationId xmlns:a16="http://schemas.microsoft.com/office/drawing/2014/main" id="{59ADD550-8769-4DB8-A1E9-7F6DD91498F8}"/>
               </a:ext>
             </a:extLst>
           </p:cNvPr>
@@ -20758,8 +20691,8 @@
         </p:blipFill>
         <p:spPr>
           <a:xfrm>
-            <a:off x="16882680" y="18175749"/>
-            <a:ext cx="2516469" cy="394741"/>
+            <a:off x="16446500" y="17984376"/>
+            <a:ext cx="2315130" cy="363158"/>
           </a:xfrm>
           <a:prstGeom prst="rect">
             <a:avLst/>
@@ -20771,7 +20704,7 @@
           <p:cNvPr id="43" name="Picture 42">
             <a:extLst>
               <a:ext uri="{FF2B5EF4-FFF2-40B4-BE49-F238E27FC236}">
-                <a16:creationId xmlns:a16="http://schemas.microsoft.com/office/drawing/2014/main" xmlns="" id="{0FC232D3-B9DC-4F4C-8D90-F59F627423F1}"/>
+                <a16:creationId xmlns:a16="http://schemas.microsoft.com/office/drawing/2014/main" id="{0FC232D3-B9DC-4F4C-8D90-F59F627423F1}"/>
               </a:ext>
             </a:extLst>
           </p:cNvPr>
@@ -20788,7 +20721,7 @@
         </p:blipFill>
         <p:spPr>
           <a:xfrm>
-            <a:off x="14994554" y="19254979"/>
+            <a:off x="15053940" y="19306069"/>
             <a:ext cx="3022476" cy="342848"/>
           </a:xfrm>
           <a:prstGeom prst="rect">
@@ -20801,7 +20734,7 @@
           <p:cNvPr id="44" name="Picture 43">
             <a:extLst>
               <a:ext uri="{FF2B5EF4-FFF2-40B4-BE49-F238E27FC236}">
-                <a16:creationId xmlns:a16="http://schemas.microsoft.com/office/drawing/2014/main" xmlns="" id="{4D428820-8168-43B4-A9F9-145E09CF65BE}"/>
+                <a16:creationId xmlns:a16="http://schemas.microsoft.com/office/drawing/2014/main" id="{4D428820-8168-43B4-A9F9-145E09CF65BE}"/>
               </a:ext>
             </a:extLst>
           </p:cNvPr>
@@ -20817,7 +20750,7 @@
         </p:blipFill>
         <p:spPr>
           <a:xfrm>
-            <a:off x="22158929" y="6320957"/>
+            <a:off x="22144415" y="6059700"/>
             <a:ext cx="9918833" cy="2359461"/>
           </a:xfrm>
           <a:prstGeom prst="rect">
@@ -20830,7 +20763,7 @@
           <p:cNvPr id="45" name="Table 44">
             <a:extLst>
               <a:ext uri="{FF2B5EF4-FFF2-40B4-BE49-F238E27FC236}">
-                <a16:creationId xmlns:a16="http://schemas.microsoft.com/office/drawing/2014/main" xmlns="" id="{3C77A42E-835E-4934-8247-2D42F8A02D4F}"/>
+                <a16:creationId xmlns:a16="http://schemas.microsoft.com/office/drawing/2014/main" id="{3C77A42E-835E-4934-8247-2D42F8A02D4F}"/>
               </a:ext>
             </a:extLst>
           </p:cNvPr>
@@ -20840,14 +20773,14 @@
           <p:nvPr>
             <p:extLst>
               <p:ext uri="{D42A27DB-BD31-4B8C-83A1-F6EECF244321}">
-                <p14:modId xmlns:p14="http://schemas.microsoft.com/office/powerpoint/2010/main" val="2981973662"/>
+                <p14:modId xmlns:p14="http://schemas.microsoft.com/office/powerpoint/2010/main" val="3633679359"/>
               </p:ext>
             </p:extLst>
           </p:nvPr>
         </p:nvGraphicFramePr>
         <p:xfrm>
-          <a:off x="22462766" y="8734362"/>
-          <a:ext cx="9216878" cy="1616604"/>
+          <a:off x="22368360" y="8752276"/>
+          <a:ext cx="9216878" cy="1423952"/>
         </p:xfrm>
         <a:graphic>
           <a:graphicData uri="http://schemas.openxmlformats.org/drawingml/2006/table">
@@ -20859,14 +20792,14 @@
                 <a:gridCol w="4612526">
                   <a:extLst>
                     <a:ext uri="{9D8B030D-6E8A-4147-A177-3AD203B41FA5}">
-                      <a16:colId xmlns:a16="http://schemas.microsoft.com/office/drawing/2014/main" xmlns="" val="1895027629"/>
+                      <a16:colId xmlns:a16="http://schemas.microsoft.com/office/drawing/2014/main" val="1895027629"/>
                     </a:ext>
                   </a:extLst>
                 </a:gridCol>
                 <a:gridCol w="4604352">
                   <a:extLst>
                     <a:ext uri="{9D8B030D-6E8A-4147-A177-3AD203B41FA5}">
-                      <a16:colId xmlns:a16="http://schemas.microsoft.com/office/drawing/2014/main" xmlns="" val="3660175351"/>
+                      <a16:colId xmlns:a16="http://schemas.microsoft.com/office/drawing/2014/main" val="3660175351"/>
                     </a:ext>
                   </a:extLst>
                 </a:gridCol>
@@ -20972,10 +20905,6 @@
                         <a:t>Task Execution Time(s)</a:t>
                       </a:r>
                     </a:p>
-                    <a:p>
-                      <a:pPr algn="ctr"/>
-                      <a:endParaRPr lang="en-US" sz="1800" b="1" dirty="0"/>
-                    </a:p>
                   </a:txBody>
                   <a:tcPr marL="0" marR="0" marT="0" marB="0">
                     <a:lnL w="12700" cap="flat" cmpd="sng" algn="ctr">
@@ -21026,7 +20955,7 @@
                 </a:tc>
                 <a:extLst>
                   <a:ext uri="{0D108BD9-81ED-4DB2-BD59-A6C34878D82A}">
-                    <a16:rowId xmlns:a16="http://schemas.microsoft.com/office/drawing/2014/main" xmlns="" val="1070860805"/>
+                    <a16:rowId xmlns:a16="http://schemas.microsoft.com/office/drawing/2014/main" val="1070860805"/>
                   </a:ext>
                 </a:extLst>
               </a:tr>
@@ -21186,7 +21115,7 @@
                 </a:tc>
                 <a:extLst>
                   <a:ext uri="{0D108BD9-81ED-4DB2-BD59-A6C34878D82A}">
-                    <a16:rowId xmlns:a16="http://schemas.microsoft.com/office/drawing/2014/main" xmlns="" val="962478704"/>
+                    <a16:rowId xmlns:a16="http://schemas.microsoft.com/office/drawing/2014/main" val="962478704"/>
                   </a:ext>
                 </a:extLst>
               </a:tr>
@@ -21335,7 +21264,7 @@
                 </a:tc>
                 <a:extLst>
                   <a:ext uri="{0D108BD9-81ED-4DB2-BD59-A6C34878D82A}">
-                    <a16:rowId xmlns:a16="http://schemas.microsoft.com/office/drawing/2014/main" xmlns="" val="350040991"/>
+                    <a16:rowId xmlns:a16="http://schemas.microsoft.com/office/drawing/2014/main" val="350040991"/>
                   </a:ext>
                 </a:extLst>
               </a:tr>
@@ -21500,7 +21429,7 @@
                 </a:tc>
                 <a:extLst>
                   <a:ext uri="{0D108BD9-81ED-4DB2-BD59-A6C34878D82A}">
-                    <a16:rowId xmlns:a16="http://schemas.microsoft.com/office/drawing/2014/main" xmlns="" val="3884262427"/>
+                    <a16:rowId xmlns:a16="http://schemas.microsoft.com/office/drawing/2014/main" val="3884262427"/>
                   </a:ext>
                 </a:extLst>
               </a:tr>
@@ -21513,7 +21442,7 @@
           <p:cNvPr id="46" name="Picture 45">
             <a:extLst>
               <a:ext uri="{FF2B5EF4-FFF2-40B4-BE49-F238E27FC236}">
-                <a16:creationId xmlns:a16="http://schemas.microsoft.com/office/drawing/2014/main" xmlns="" id="{D9D74B86-22AD-4DBA-808A-A0F3389287F8}"/>
+                <a16:creationId xmlns:a16="http://schemas.microsoft.com/office/drawing/2014/main" id="{D9D74B86-22AD-4DBA-808A-A0F3389287F8}"/>
               </a:ext>
             </a:extLst>
           </p:cNvPr>
@@ -21522,16 +21451,15 @@
           </p:cNvPicPr>
           <p:nvPr/>
         </p:nvPicPr>
-        <p:blipFill>
+        <p:blipFill rotWithShape="1">
           <a:blip r:embed="rId26"/>
-          <a:stretch>
-            <a:fillRect/>
-          </a:stretch>
+          <a:srcRect t="3103"/>
+          <a:stretch/>
         </p:blipFill>
         <p:spPr>
           <a:xfrm>
-            <a:off x="24243682" y="11461844"/>
-            <a:ext cx="5738045" cy="1495990"/>
+            <a:off x="24143915" y="11538636"/>
+            <a:ext cx="5375302" cy="1357926"/>
           </a:xfrm>
           <a:prstGeom prst="rect">
             <a:avLst/>
@@ -21543,7 +21471,7 @@
           <p:cNvPr id="48" name="Table 47">
             <a:extLst>
               <a:ext uri="{FF2B5EF4-FFF2-40B4-BE49-F238E27FC236}">
-                <a16:creationId xmlns:a16="http://schemas.microsoft.com/office/drawing/2014/main" xmlns="" id="{29B33522-A2BE-49F8-8216-6B51E25C91E7}"/>
+                <a16:creationId xmlns:a16="http://schemas.microsoft.com/office/drawing/2014/main" id="{29B33522-A2BE-49F8-8216-6B51E25C91E7}"/>
               </a:ext>
             </a:extLst>
           </p:cNvPr>
@@ -21553,14 +21481,14 @@
           <p:nvPr>
             <p:extLst>
               <p:ext uri="{D42A27DB-BD31-4B8C-83A1-F6EECF244321}">
-                <p14:modId xmlns:p14="http://schemas.microsoft.com/office/powerpoint/2010/main" val="2769617897"/>
+                <p14:modId xmlns:p14="http://schemas.microsoft.com/office/powerpoint/2010/main" val="3210122665"/>
               </p:ext>
             </p:extLst>
           </p:nvPr>
         </p:nvGraphicFramePr>
         <p:xfrm>
-          <a:off x="22462766" y="13986898"/>
-          <a:ext cx="9216878" cy="1865173"/>
+          <a:off x="22462766" y="13019744"/>
+          <a:ext cx="9216878" cy="1060519"/>
         </p:xfrm>
         <a:graphic>
           <a:graphicData uri="http://schemas.openxmlformats.org/drawingml/2006/table">
@@ -21572,26 +21500,26 @@
                 <a:gridCol w="3073281">
                   <a:extLst>
                     <a:ext uri="{9D8B030D-6E8A-4147-A177-3AD203B41FA5}">
-                      <a16:colId xmlns:a16="http://schemas.microsoft.com/office/drawing/2014/main" xmlns="" val="1895027629"/>
+                      <a16:colId xmlns:a16="http://schemas.microsoft.com/office/drawing/2014/main" val="1895027629"/>
                     </a:ext>
                   </a:extLst>
                 </a:gridCol>
                 <a:gridCol w="3073281">
                   <a:extLst>
                     <a:ext uri="{9D8B030D-6E8A-4147-A177-3AD203B41FA5}">
-                      <a16:colId xmlns:a16="http://schemas.microsoft.com/office/drawing/2014/main" xmlns="" val="2482140226"/>
+                      <a16:colId xmlns:a16="http://schemas.microsoft.com/office/drawing/2014/main" val="2482140226"/>
                     </a:ext>
                   </a:extLst>
                 </a:gridCol>
                 <a:gridCol w="3070316">
                   <a:extLst>
                     <a:ext uri="{9D8B030D-6E8A-4147-A177-3AD203B41FA5}">
-                      <a16:colId xmlns:a16="http://schemas.microsoft.com/office/drawing/2014/main" xmlns="" val="3660175351"/>
+                      <a16:colId xmlns:a16="http://schemas.microsoft.com/office/drawing/2014/main" val="3660175351"/>
                     </a:ext>
                   </a:extLst>
                 </a:gridCol>
               </a:tblGrid>
-              <a:tr h="530637">
+              <a:tr h="301690">
                 <a:tc>
                   <a:txBody>
                     <a:bodyPr/>
@@ -21758,10 +21686,6 @@
                         <a:cs typeface="+mn-cs"/>
                       </a:endParaRPr>
                     </a:p>
-                    <a:p>
-                      <a:pPr algn="ctr"/>
-                      <a:endParaRPr lang="en-US" sz="1800" b="1" i="1" dirty="0"/>
-                    </a:p>
                   </a:txBody>
                   <a:tcPr marL="69226" marR="69226" marT="34614" marB="34614">
                     <a:lnL w="12700" cap="flat" cmpd="sng" algn="ctr">
@@ -21804,11 +21728,11 @@
                 </a:tc>
                 <a:extLst>
                   <a:ext uri="{0D108BD9-81ED-4DB2-BD59-A6C34878D82A}">
-                    <a16:rowId xmlns:a16="http://schemas.microsoft.com/office/drawing/2014/main" xmlns="" val="1070860805"/>
+                    <a16:rowId xmlns:a16="http://schemas.microsoft.com/office/drawing/2014/main" val="1070860805"/>
                   </a:ext>
                 </a:extLst>
               </a:tr>
-              <a:tr h="330215">
+              <a:tr h="301690">
                 <a:tc>
                   <a:txBody>
                     <a:bodyPr/>
@@ -21969,14 +21893,6 @@
                         <a:t>12.5%</a:t>
                       </a:r>
                     </a:p>
-                    <a:p>
-                      <a:pPr algn="ctr"/>
-                      <a:endParaRPr lang="en-US" sz="1800" dirty="0">
-                        <a:solidFill>
-                          <a:schemeClr val="tx1"/>
-                        </a:solidFill>
-                      </a:endParaRPr>
-                    </a:p>
                   </a:txBody>
                   <a:tcPr marL="69226" marR="69226" marT="34614" marB="34614">
                     <a:lnL w="12700" cap="flat" cmpd="sng" algn="ctr">
@@ -22019,11 +21935,11 @@
                 </a:tc>
                 <a:extLst>
                   <a:ext uri="{0D108BD9-81ED-4DB2-BD59-A6C34878D82A}">
-                    <a16:rowId xmlns:a16="http://schemas.microsoft.com/office/drawing/2014/main" xmlns="" val="962478704"/>
+                    <a16:rowId xmlns:a16="http://schemas.microsoft.com/office/drawing/2014/main" val="962478704"/>
                   </a:ext>
                 </a:extLst>
               </a:tr>
-              <a:tr h="629437">
+              <a:tr h="373423">
                 <a:tc>
                   <a:txBody>
                     <a:bodyPr/>
@@ -22215,7 +22131,7 @@
                 </a:tc>
                 <a:extLst>
                   <a:ext uri="{0D108BD9-81ED-4DB2-BD59-A6C34878D82A}">
-                    <a16:rowId xmlns:a16="http://schemas.microsoft.com/office/drawing/2014/main" xmlns="" val="350040991"/>
+                    <a16:rowId xmlns:a16="http://schemas.microsoft.com/office/drawing/2014/main" val="350040991"/>
                   </a:ext>
                 </a:extLst>
               </a:tr>
@@ -22228,7 +22144,7 @@
           <p:cNvPr id="49" name="Picture 48">
             <a:extLst>
               <a:ext uri="{FF2B5EF4-FFF2-40B4-BE49-F238E27FC236}">
-                <a16:creationId xmlns:a16="http://schemas.microsoft.com/office/drawing/2014/main" xmlns="" id="{AEB371CC-9E48-4C24-BD0C-90BDA67C90AC}"/>
+                <a16:creationId xmlns:a16="http://schemas.microsoft.com/office/drawing/2014/main" id="{AEB371CC-9E48-4C24-BD0C-90BDA67C90AC}"/>
               </a:ext>
             </a:extLst>
           </p:cNvPr>
@@ -22251,7 +22167,7 @@
         </p:blipFill>
         <p:spPr>
           <a:xfrm>
-            <a:off x="24858130" y="4607800"/>
+            <a:off x="23434638" y="4066895"/>
             <a:ext cx="7356131" cy="1567285"/>
           </a:xfrm>
           <a:prstGeom prst="rect">
@@ -22264,7 +22180,7 @@
           <p:cNvPr id="50" name="Picture 49">
             <a:extLst>
               <a:ext uri="{FF2B5EF4-FFF2-40B4-BE49-F238E27FC236}">
-                <a16:creationId xmlns:a16="http://schemas.microsoft.com/office/drawing/2014/main" xmlns="" id="{4D5C8C28-2813-4AA0-9B4D-2DFC6F832F59}"/>
+                <a16:creationId xmlns:a16="http://schemas.microsoft.com/office/drawing/2014/main" id="{4D5C8C28-2813-4AA0-9B4D-2DFC6F832F59}"/>
               </a:ext>
             </a:extLst>
           </p:cNvPr>
@@ -22281,7 +22197,7 @@
         </p:blipFill>
         <p:spPr>
           <a:xfrm>
-            <a:off x="22398130" y="16495739"/>
+            <a:off x="22388917" y="15584561"/>
             <a:ext cx="4516048" cy="2020862"/>
           </a:xfrm>
           <a:prstGeom prst="roundRect">
@@ -22321,7 +22237,7 @@
           <p:cNvPr id="51" name="Picture 50">
             <a:extLst>
               <a:ext uri="{FF2B5EF4-FFF2-40B4-BE49-F238E27FC236}">
-                <a16:creationId xmlns:a16="http://schemas.microsoft.com/office/drawing/2014/main" xmlns="" id="{36696632-CE53-41F1-8701-BD136FB0BC54}"/>
+                <a16:creationId xmlns:a16="http://schemas.microsoft.com/office/drawing/2014/main" id="{36696632-CE53-41F1-8701-BD136FB0BC54}"/>
               </a:ext>
             </a:extLst>
           </p:cNvPr>
@@ -22338,7 +22254,7 @@
         </p:blipFill>
         <p:spPr>
           <a:xfrm>
-            <a:off x="27294940" y="16478154"/>
+            <a:off x="27251560" y="15527362"/>
             <a:ext cx="4537922" cy="2084882"/>
           </a:xfrm>
           <a:prstGeom prst="roundRect">
@@ -22381,13 +22297,20 @@
         </p:nvSpPr>
         <p:spPr>
           <a:xfrm>
-            <a:off x="29304341" y="421433"/>
+            <a:off x="29328404" y="373307"/>
             <a:ext cx="3961485" cy="1446550"/>
           </a:xfrm>
           <a:prstGeom prst="rect">
             <a:avLst/>
           </a:prstGeom>
           <a:noFill/>
+          <a:effectLst>
+            <a:glow rad="127000">
+              <a:schemeClr val="accent1">
+                <a:alpha val="40000"/>
+              </a:schemeClr>
+            </a:glow>
+          </a:effectLst>
         </p:spPr>
         <p:txBody>
           <a:bodyPr wrap="square" rtlCol="0">
@@ -22396,16 +22319,478 @@
           <a:lstStyle/>
           <a:p>
             <a:r>
-              <a:rPr lang="en-US" sz="8800" b="1" dirty="0" smtClean="0">
+              <a:rPr lang="en-US" sz="8800" b="1" dirty="0">
+                <a:effectLst>
+                  <a:glow rad="215900">
+                    <a:schemeClr val="bg1">
+                      <a:alpha val="40000"/>
+                    </a:schemeClr>
+                  </a:glow>
+                </a:effectLst>
                 <a:latin typeface="+mj-lt"/>
                 <a:cs typeface="Times New Roman" panose="02020603050405020304" pitchFamily="18" charset="0"/>
               </a:rPr>
               <a:t>AHS’17</a:t>
             </a:r>
-            <a:endParaRPr lang="en-US" sz="8800" b="1" dirty="0">
-              <a:latin typeface="+mj-lt"/>
-              <a:cs typeface="Times New Roman" panose="02020603050405020304" pitchFamily="18" charset="0"/>
-            </a:endParaRPr>
+          </a:p>
+        </p:txBody>
+      </p:sp>
+      <p:sp>
+        <p:nvSpPr>
+          <p:cNvPr id="47" name="Text Placeholder 9">
+            <a:extLst>
+              <a:ext uri="{FF2B5EF4-FFF2-40B4-BE49-F238E27FC236}">
+                <a16:creationId xmlns:a16="http://schemas.microsoft.com/office/drawing/2014/main" id="{DE9F1513-3836-474C-9D00-82200A85CC41}"/>
+              </a:ext>
+            </a:extLst>
+          </p:cNvPr>
+          <p:cNvSpPr txBox="1">
+            <a:spLocks/>
+          </p:cNvSpPr>
+          <p:nvPr/>
+        </p:nvSpPr>
+        <p:spPr>
+          <a:xfrm>
+            <a:off x="22072624" y="10103505"/>
+            <a:ext cx="10182022" cy="624326"/>
+          </a:xfrm>
+          <a:prstGeom prst="rect">
+            <a:avLst/>
+          </a:prstGeom>
+          <a:noFill/>
+        </p:spPr>
+        <p:txBody>
+          <a:bodyPr wrap="square" lIns="65304" tIns="65304" rIns="65304" bIns="65304" anchor="ctr" anchorCtr="0">
+            <a:spAutoFit/>
+          </a:bodyPr>
+          <a:lstStyle>
+            <a:lvl1pPr marL="0" indent="0" algn="ctr" defTabSz="3134552" rtl="0" eaLnBrk="1" latinLnBrk="0" hangingPunct="1">
+              <a:spcBef>
+                <a:spcPct val="20000"/>
+              </a:spcBef>
+              <a:buFont typeface="Arial" pitchFamily="34" charset="0"/>
+              <a:buNone/>
+              <a:defRPr sz="2600" b="1" u="sng" kern="1200" baseline="0">
+                <a:solidFill>
+                  <a:schemeClr val="tx1"/>
+                </a:solidFill>
+                <a:latin typeface="+mn-lt"/>
+                <a:ea typeface="+mn-ea"/>
+                <a:cs typeface="+mn-cs"/>
+              </a:defRPr>
+            </a:lvl1pPr>
+            <a:lvl2pPr marL="2546824" indent="-979547" algn="l" defTabSz="3134552" rtl="0" eaLnBrk="1" latinLnBrk="0" hangingPunct="1">
+              <a:spcBef>
+                <a:spcPct val="20000"/>
+              </a:spcBef>
+              <a:buFont typeface="Arial" pitchFamily="34" charset="0"/>
+              <a:buChar char="–"/>
+              <a:defRPr sz="9600" kern="1200">
+                <a:solidFill>
+                  <a:schemeClr val="tx1"/>
+                </a:solidFill>
+                <a:latin typeface="+mn-lt"/>
+                <a:ea typeface="+mn-ea"/>
+                <a:cs typeface="+mn-cs"/>
+              </a:defRPr>
+            </a:lvl2pPr>
+            <a:lvl3pPr marL="3918191" indent="-783639" algn="l" defTabSz="3134552" rtl="0" eaLnBrk="1" latinLnBrk="0" hangingPunct="1">
+              <a:spcBef>
+                <a:spcPct val="20000"/>
+              </a:spcBef>
+              <a:buFont typeface="Arial" pitchFamily="34" charset="0"/>
+              <a:buChar char="•"/>
+              <a:defRPr sz="8300" kern="1200">
+                <a:solidFill>
+                  <a:schemeClr val="tx1"/>
+                </a:solidFill>
+                <a:latin typeface="+mn-lt"/>
+                <a:ea typeface="+mn-ea"/>
+                <a:cs typeface="+mn-cs"/>
+              </a:defRPr>
+            </a:lvl3pPr>
+            <a:lvl4pPr marL="5485468" indent="-783639" algn="l" defTabSz="3134552" rtl="0" eaLnBrk="1" latinLnBrk="0" hangingPunct="1">
+              <a:spcBef>
+                <a:spcPct val="20000"/>
+              </a:spcBef>
+              <a:buFont typeface="Arial" pitchFamily="34" charset="0"/>
+              <a:buChar char="–"/>
+              <a:defRPr sz="6900" kern="1200">
+                <a:solidFill>
+                  <a:schemeClr val="tx1"/>
+                </a:solidFill>
+                <a:latin typeface="+mn-lt"/>
+                <a:ea typeface="+mn-ea"/>
+                <a:cs typeface="+mn-cs"/>
+              </a:defRPr>
+            </a:lvl4pPr>
+            <a:lvl5pPr marL="7052744" indent="-783639" algn="l" defTabSz="3134552" rtl="0" eaLnBrk="1" latinLnBrk="0" hangingPunct="1">
+              <a:spcBef>
+                <a:spcPct val="20000"/>
+              </a:spcBef>
+              <a:buFont typeface="Arial" pitchFamily="34" charset="0"/>
+              <a:buChar char="»"/>
+              <a:defRPr sz="6900" kern="1200">
+                <a:solidFill>
+                  <a:schemeClr val="tx1"/>
+                </a:solidFill>
+                <a:latin typeface="+mn-lt"/>
+                <a:ea typeface="+mn-ea"/>
+                <a:cs typeface="+mn-cs"/>
+              </a:defRPr>
+            </a:lvl5pPr>
+            <a:lvl6pPr marL="8620020" indent="-783639" algn="l" defTabSz="3134552" rtl="0" eaLnBrk="1" latinLnBrk="0" hangingPunct="1">
+              <a:spcBef>
+                <a:spcPct val="20000"/>
+              </a:spcBef>
+              <a:buFont typeface="Arial" pitchFamily="34" charset="0"/>
+              <a:buChar char="•"/>
+              <a:defRPr sz="6900" kern="1200">
+                <a:solidFill>
+                  <a:schemeClr val="tx1"/>
+                </a:solidFill>
+                <a:latin typeface="+mn-lt"/>
+                <a:ea typeface="+mn-ea"/>
+                <a:cs typeface="+mn-cs"/>
+              </a:defRPr>
+            </a:lvl6pPr>
+            <a:lvl7pPr marL="10187296" indent="-783639" algn="l" defTabSz="3134552" rtl="0" eaLnBrk="1" latinLnBrk="0" hangingPunct="1">
+              <a:spcBef>
+                <a:spcPct val="20000"/>
+              </a:spcBef>
+              <a:buFont typeface="Arial" pitchFamily="34" charset="0"/>
+              <a:buChar char="•"/>
+              <a:defRPr sz="6900" kern="1200">
+                <a:solidFill>
+                  <a:schemeClr val="tx1"/>
+                </a:solidFill>
+                <a:latin typeface="+mn-lt"/>
+                <a:ea typeface="+mn-ea"/>
+                <a:cs typeface="+mn-cs"/>
+              </a:defRPr>
+            </a:lvl7pPr>
+            <a:lvl8pPr marL="11754573" indent="-783639" algn="l" defTabSz="3134552" rtl="0" eaLnBrk="1" latinLnBrk="0" hangingPunct="1">
+              <a:spcBef>
+                <a:spcPct val="20000"/>
+              </a:spcBef>
+              <a:buFont typeface="Arial" pitchFamily="34" charset="0"/>
+              <a:buChar char="•"/>
+              <a:defRPr sz="6900" kern="1200">
+                <a:solidFill>
+                  <a:schemeClr val="tx1"/>
+                </a:solidFill>
+                <a:latin typeface="+mn-lt"/>
+                <a:ea typeface="+mn-ea"/>
+                <a:cs typeface="+mn-cs"/>
+              </a:defRPr>
+            </a:lvl8pPr>
+            <a:lvl9pPr marL="13321849" indent="-783639" algn="l" defTabSz="3134552" rtl="0" eaLnBrk="1" latinLnBrk="0" hangingPunct="1">
+              <a:spcBef>
+                <a:spcPct val="20000"/>
+              </a:spcBef>
+              <a:buFont typeface="Arial" pitchFamily="34" charset="0"/>
+              <a:buChar char="•"/>
+              <a:defRPr sz="6900" kern="1200">
+                <a:solidFill>
+                  <a:schemeClr val="tx1"/>
+                </a:solidFill>
+                <a:latin typeface="+mn-lt"/>
+                <a:ea typeface="+mn-ea"/>
+                <a:cs typeface="+mn-cs"/>
+              </a:defRPr>
+            </a:lvl9pPr>
+          </a:lstStyle>
+          <a:p>
+            <a:r>
+              <a:rPr lang="en-US" sz="3200" dirty="0">
+                <a:latin typeface="+mj-lt"/>
+              </a:rPr>
+              <a:t>EXPERIMENTS</a:t>
+            </a:r>
+          </a:p>
+        </p:txBody>
+      </p:sp>
+      <p:sp>
+        <p:nvSpPr>
+          <p:cNvPr id="19" name="Rectangle 18">
+            <a:extLst>
+              <a:ext uri="{FF2B5EF4-FFF2-40B4-BE49-F238E27FC236}">
+                <a16:creationId xmlns:a16="http://schemas.microsoft.com/office/drawing/2014/main" id="{8A4B49DD-7059-425A-AF02-A227E2E2B730}"/>
+              </a:ext>
+            </a:extLst>
+          </p:cNvPr>
+          <p:cNvSpPr/>
+          <p:nvPr/>
+        </p:nvSpPr>
+        <p:spPr>
+          <a:xfrm>
+            <a:off x="23434638" y="17655740"/>
+            <a:ext cx="2262525" cy="400110"/>
+          </a:xfrm>
+          <a:prstGeom prst="rect">
+            <a:avLst/>
+          </a:prstGeom>
+        </p:spPr>
+        <p:txBody>
+          <a:bodyPr wrap="square">
+            <a:spAutoFit/>
+          </a:bodyPr>
+          <a:lstStyle/>
+          <a:p>
+            <a:r>
+              <a:rPr lang="en-US" sz="2000" dirty="0"/>
+              <a:t>Without Adaptation</a:t>
+            </a:r>
+          </a:p>
+        </p:txBody>
+      </p:sp>
+      <p:sp>
+        <p:nvSpPr>
+          <p:cNvPr id="52" name="Rectangle 51">
+            <a:extLst>
+              <a:ext uri="{FF2B5EF4-FFF2-40B4-BE49-F238E27FC236}">
+                <a16:creationId xmlns:a16="http://schemas.microsoft.com/office/drawing/2014/main" id="{51E3C8B8-FB37-4216-B2F0-1CBEED37891E}"/>
+              </a:ext>
+            </a:extLst>
+          </p:cNvPr>
+          <p:cNvSpPr/>
+          <p:nvPr/>
+        </p:nvSpPr>
+        <p:spPr>
+          <a:xfrm>
+            <a:off x="28440400" y="17626713"/>
+            <a:ext cx="1984391" cy="400110"/>
+          </a:xfrm>
+          <a:prstGeom prst="rect">
+            <a:avLst/>
+          </a:prstGeom>
+        </p:spPr>
+        <p:txBody>
+          <a:bodyPr wrap="square">
+            <a:spAutoFit/>
+          </a:bodyPr>
+          <a:lstStyle/>
+          <a:p>
+            <a:r>
+              <a:rPr lang="en-US" sz="2000" dirty="0"/>
+              <a:t>With Adaptation</a:t>
+            </a:r>
+          </a:p>
+        </p:txBody>
+      </p:sp>
+      <p:sp>
+        <p:nvSpPr>
+          <p:cNvPr id="53" name="Text Placeholder 10">
+            <a:extLst>
+              <a:ext uri="{FF2B5EF4-FFF2-40B4-BE49-F238E27FC236}">
+                <a16:creationId xmlns:a16="http://schemas.microsoft.com/office/drawing/2014/main" id="{2FCAA8AF-2E0A-4966-BBDA-06DDA07C4BF8}"/>
+              </a:ext>
+            </a:extLst>
+          </p:cNvPr>
+          <p:cNvSpPr txBox="1">
+            <a:spLocks/>
+          </p:cNvSpPr>
+          <p:nvPr/>
+        </p:nvSpPr>
+        <p:spPr>
+          <a:xfrm>
+            <a:off x="24877461" y="5511053"/>
+            <a:ext cx="4717168" cy="606704"/>
+          </a:xfrm>
+          <a:prstGeom prst="rect">
+            <a:avLst/>
+          </a:prstGeom>
+        </p:spPr>
+        <p:txBody>
+          <a:bodyPr wrap="square" lIns="163258" tIns="163258" rIns="163258" bIns="163258">
+            <a:spAutoFit/>
+          </a:bodyPr>
+          <a:lstStyle>
+            <a:lvl1pPr marL="0" indent="0" algn="l" defTabSz="3134552" rtl="0" eaLnBrk="1" latinLnBrk="0" hangingPunct="1">
+              <a:spcBef>
+                <a:spcPct val="20000"/>
+              </a:spcBef>
+              <a:buFont typeface="Arial" pitchFamily="34" charset="0"/>
+              <a:buNone/>
+              <a:defRPr sz="1800" kern="1200">
+                <a:solidFill>
+                  <a:schemeClr val="tx1"/>
+                </a:solidFill>
+                <a:latin typeface="Times New Roman" panose="02020603050405020304" pitchFamily="18" charset="0"/>
+                <a:ea typeface="+mn-ea"/>
+                <a:cs typeface="Times New Roman" panose="02020603050405020304" pitchFamily="18" charset="0"/>
+              </a:defRPr>
+            </a:lvl1pPr>
+            <a:lvl2pPr marL="1061176" indent="-408145" algn="l" defTabSz="3134552" rtl="0" eaLnBrk="1" latinLnBrk="0" hangingPunct="1">
+              <a:spcBef>
+                <a:spcPct val="20000"/>
+              </a:spcBef>
+              <a:buFont typeface="Arial" pitchFamily="34" charset="0"/>
+              <a:buChar char="–"/>
+              <a:defRPr sz="1800" kern="1200">
+                <a:solidFill>
+                  <a:schemeClr val="tx1"/>
+                </a:solidFill>
+                <a:latin typeface="Trebuchet MS" pitchFamily="34" charset="0"/>
+                <a:ea typeface="+mn-ea"/>
+                <a:cs typeface="+mn-cs"/>
+              </a:defRPr>
+            </a:lvl2pPr>
+            <a:lvl3pPr marL="1469322" indent="-408145" algn="l" defTabSz="3134552" rtl="0" eaLnBrk="1" latinLnBrk="0" hangingPunct="1">
+              <a:spcBef>
+                <a:spcPct val="20000"/>
+              </a:spcBef>
+              <a:buFont typeface="Arial" pitchFamily="34" charset="0"/>
+              <a:buChar char="•"/>
+              <a:defRPr sz="1800" kern="1200">
+                <a:solidFill>
+                  <a:schemeClr val="tx1"/>
+                </a:solidFill>
+                <a:latin typeface="Trebuchet MS" pitchFamily="34" charset="0"/>
+                <a:ea typeface="+mn-ea"/>
+                <a:cs typeface="+mn-cs"/>
+              </a:defRPr>
+            </a:lvl3pPr>
+            <a:lvl4pPr marL="1918281" indent="-448960" algn="l" defTabSz="3134552" rtl="0" eaLnBrk="1" latinLnBrk="0" hangingPunct="1">
+              <a:spcBef>
+                <a:spcPct val="20000"/>
+              </a:spcBef>
+              <a:buFont typeface="Arial" pitchFamily="34" charset="0"/>
+              <a:buChar char="–"/>
+              <a:defRPr sz="1800" kern="1200">
+                <a:solidFill>
+                  <a:schemeClr val="tx1"/>
+                </a:solidFill>
+                <a:latin typeface="Trebuchet MS" pitchFamily="34" charset="0"/>
+                <a:ea typeface="+mn-ea"/>
+                <a:cs typeface="+mn-cs"/>
+              </a:defRPr>
+            </a:lvl4pPr>
+            <a:lvl5pPr marL="2244797" indent="-326516" algn="l" defTabSz="3134552" rtl="0" eaLnBrk="1" latinLnBrk="0" hangingPunct="1">
+              <a:spcBef>
+                <a:spcPct val="20000"/>
+              </a:spcBef>
+              <a:buFont typeface="Arial" pitchFamily="34" charset="0"/>
+              <a:buChar char="»"/>
+              <a:defRPr sz="1800" kern="1200">
+                <a:solidFill>
+                  <a:schemeClr val="tx1"/>
+                </a:solidFill>
+                <a:latin typeface="Trebuchet MS" pitchFamily="34" charset="0"/>
+                <a:ea typeface="+mn-ea"/>
+                <a:cs typeface="+mn-cs"/>
+              </a:defRPr>
+            </a:lvl5pPr>
+            <a:lvl6pPr marL="8620020" indent="-783639" algn="l" defTabSz="3134552" rtl="0" eaLnBrk="1" latinLnBrk="0" hangingPunct="1">
+              <a:spcBef>
+                <a:spcPct val="20000"/>
+              </a:spcBef>
+              <a:buFont typeface="Arial" pitchFamily="34" charset="0"/>
+              <a:buChar char="•"/>
+              <a:defRPr sz="6900" kern="1200">
+                <a:solidFill>
+                  <a:schemeClr val="tx1"/>
+                </a:solidFill>
+                <a:latin typeface="+mn-lt"/>
+                <a:ea typeface="+mn-ea"/>
+                <a:cs typeface="+mn-cs"/>
+              </a:defRPr>
+            </a:lvl6pPr>
+            <a:lvl7pPr marL="10187296" indent="-783639" algn="l" defTabSz="3134552" rtl="0" eaLnBrk="1" latinLnBrk="0" hangingPunct="1">
+              <a:spcBef>
+                <a:spcPct val="20000"/>
+              </a:spcBef>
+              <a:buFont typeface="Arial" pitchFamily="34" charset="0"/>
+              <a:buChar char="•"/>
+              <a:defRPr sz="6900" kern="1200">
+                <a:solidFill>
+                  <a:schemeClr val="tx1"/>
+                </a:solidFill>
+                <a:latin typeface="+mn-lt"/>
+                <a:ea typeface="+mn-ea"/>
+                <a:cs typeface="+mn-cs"/>
+              </a:defRPr>
+            </a:lvl7pPr>
+            <a:lvl8pPr marL="11754573" indent="-783639" algn="l" defTabSz="3134552" rtl="0" eaLnBrk="1" latinLnBrk="0" hangingPunct="1">
+              <a:spcBef>
+                <a:spcPct val="20000"/>
+              </a:spcBef>
+              <a:buFont typeface="Arial" pitchFamily="34" charset="0"/>
+              <a:buChar char="•"/>
+              <a:defRPr sz="6900" kern="1200">
+                <a:solidFill>
+                  <a:schemeClr val="tx1"/>
+                </a:solidFill>
+                <a:latin typeface="+mn-lt"/>
+                <a:ea typeface="+mn-ea"/>
+                <a:cs typeface="+mn-cs"/>
+              </a:defRPr>
+            </a:lvl8pPr>
+            <a:lvl9pPr marL="13321849" indent="-783639" algn="l" defTabSz="3134552" rtl="0" eaLnBrk="1" latinLnBrk="0" hangingPunct="1">
+              <a:spcBef>
+                <a:spcPct val="20000"/>
+              </a:spcBef>
+              <a:buFont typeface="Arial" pitchFamily="34" charset="0"/>
+              <a:buChar char="•"/>
+              <a:defRPr sz="6900" kern="1200">
+                <a:solidFill>
+                  <a:schemeClr val="tx1"/>
+                </a:solidFill>
+                <a:latin typeface="+mn-lt"/>
+                <a:ea typeface="+mn-ea"/>
+                <a:cs typeface="+mn-cs"/>
+              </a:defRPr>
+            </a:lvl9pPr>
+          </a:lstStyle>
+          <a:p>
+            <a:r>
+              <a:rPr lang="en-US" dirty="0">
+                <a:latin typeface="+mj-lt"/>
+              </a:rPr>
+              <a:t>Imposing cyclic controller runtime overheads</a:t>
+            </a:r>
+          </a:p>
+        </p:txBody>
+      </p:sp>
+      <p:sp>
+        <p:nvSpPr>
+          <p:cNvPr id="23" name="Rectangle 22">
+            <a:extLst>
+              <a:ext uri="{FF2B5EF4-FFF2-40B4-BE49-F238E27FC236}">
+                <a16:creationId xmlns:a16="http://schemas.microsoft.com/office/drawing/2014/main" id="{C689E354-6397-487C-9CD3-8D0276706746}"/>
+              </a:ext>
+            </a:extLst>
+          </p:cNvPr>
+          <p:cNvSpPr/>
+          <p:nvPr/>
+        </p:nvSpPr>
+        <p:spPr>
+          <a:xfrm>
+            <a:off x="1219426" y="20136741"/>
+            <a:ext cx="16459200" cy="369332"/>
+          </a:xfrm>
+          <a:prstGeom prst="rect">
+            <a:avLst/>
+          </a:prstGeom>
+        </p:spPr>
+        <p:txBody>
+          <a:bodyPr>
+            <a:spAutoFit/>
+          </a:bodyPr>
+          <a:lstStyle/>
+          <a:p>
+            <a:r>
+              <a:rPr lang="en-US" sz="1800" baseline="30000" dirty="0">
+                <a:cs typeface="Times New Roman" panose="02020603050405020304" pitchFamily="18" charset="0"/>
+              </a:rPr>
+              <a:t>1</a:t>
+            </a:r>
+            <a:r>
+              <a:rPr lang="en-US" sz="1800" dirty="0">
+                <a:latin typeface="+mj-lt"/>
+              </a:rPr>
+              <a:t>M. Co, et al., “Double helix and raven: A system for cyber fault tolerance and recovery”, CISRC ’16.</a:t>
+            </a:r>
           </a:p>
         </p:txBody>
       </p:sp>

</xml_diff>